<commit_message>
Added "watering bonsai" slide to running deck Cross-updated event deck
</commit_message>
<xml_diff>
--- a/Courseware/Bonsai Evening A (2024-07-04).pptx
+++ b/Courseware/Bonsai Evening A (2024-07-04).pptx
@@ -7,13 +7,14 @@
   <p:sldIdLst>
     <p:sldId id="256" r:id="rId2"/>
     <p:sldId id="257" r:id="rId3"/>
-    <p:sldId id="282" r:id="rId4"/>
-    <p:sldId id="258" r:id="rId5"/>
-    <p:sldId id="260" r:id="rId6"/>
-    <p:sldId id="262" r:id="rId7"/>
-    <p:sldId id="265" r:id="rId8"/>
-    <p:sldId id="266" r:id="rId9"/>
-    <p:sldId id="276" r:id="rId10"/>
+    <p:sldId id="283" r:id="rId4"/>
+    <p:sldId id="284" r:id="rId5"/>
+    <p:sldId id="285" r:id="rId6"/>
+    <p:sldId id="286" r:id="rId7"/>
+    <p:sldId id="287" r:id="rId8"/>
+    <p:sldId id="288" r:id="rId9"/>
+    <p:sldId id="289" r:id="rId10"/>
+    <p:sldId id="276" r:id="rId11"/>
   </p:sldIdLst>
   <p:sldSz cx="12192000" cy="6858000"/>
   <p:notesSz cx="6858000" cy="9144000"/>
@@ -5967,6 +5968,72 @@
 </p:sld>
 </file>
 
+<file path=ppt/slides/slide10.xml><?xml version="1.0" encoding="utf-8"?>
+<p:sld xmlns:a="http://schemas.openxmlformats.org/drawingml/2006/main" xmlns:r="http://schemas.openxmlformats.org/officeDocument/2006/relationships" xmlns:p="http://schemas.openxmlformats.org/presentationml/2006/main">
+  <p:cSld>
+    <p:spTree>
+      <p:nvGrpSpPr>
+        <p:cNvPr id="1" name=""/>
+        <p:cNvGrpSpPr/>
+        <p:nvPr/>
+      </p:nvGrpSpPr>
+      <p:grpSpPr>
+        <a:xfrm>
+          <a:off x="0" y="0"/>
+          <a:ext cx="0" cy="0"/>
+          <a:chOff x="0" y="0"/>
+          <a:chExt cx="0" cy="0"/>
+        </a:xfrm>
+      </p:grpSpPr>
+      <p:sp>
+        <p:nvSpPr>
+          <p:cNvPr id="2" name="Title 1">
+            <a:extLst>
+              <a:ext uri="{FF2B5EF4-FFF2-40B4-BE49-F238E27FC236}">
+                <a16:creationId xmlns:a16="http://schemas.microsoft.com/office/drawing/2014/main" id="{C97573B0-7B73-B186-D32F-E842E8D32CFC}"/>
+              </a:ext>
+            </a:extLst>
+          </p:cNvPr>
+          <p:cNvSpPr>
+            <a:spLocks noGrp="1"/>
+          </p:cNvSpPr>
+          <p:nvPr>
+            <p:ph type="ctrTitle"/>
+          </p:nvPr>
+        </p:nvSpPr>
+        <p:spPr/>
+        <p:txBody>
+          <a:bodyPr/>
+          <a:lstStyle/>
+          <a:p>
+            <a:r>
+              <a:rPr lang="en-US" dirty="0"/>
+              <a:t>Thanks For Attending!</a:t>
+            </a:r>
+            <a:br>
+              <a:rPr lang="en-US" dirty="0"/>
+            </a:br>
+            <a:r>
+              <a:rPr lang="en-US" sz="4000" dirty="0"/>
+              <a:t>See you next week</a:t>
+            </a:r>
+            <a:endParaRPr lang="en-GB" sz="4000" dirty="0"/>
+          </a:p>
+        </p:txBody>
+      </p:sp>
+    </p:spTree>
+    <p:extLst>
+      <p:ext uri="{BB962C8B-B14F-4D97-AF65-F5344CB8AC3E}">
+        <p14:creationId xmlns:p14="http://schemas.microsoft.com/office/powerpoint/2010/main" val="2843185871"/>
+      </p:ext>
+    </p:extLst>
+  </p:cSld>
+  <p:clrMapOvr>
+    <a:masterClrMapping/>
+  </p:clrMapOvr>
+</p:sld>
+</file>
+
 <file path=ppt/slides/slide2.xml><?xml version="1.0" encoding="utf-8"?>
 <p:sld xmlns:a="http://schemas.openxmlformats.org/drawingml/2006/main" xmlns:r="http://schemas.openxmlformats.org/officeDocument/2006/relationships" xmlns:p="http://schemas.openxmlformats.org/presentationml/2006/main">
   <p:cSld>
@@ -6355,27 +6422,27 @@
           </a:p>
           <a:p>
             <a:r>
-              <a:rPr lang="en-US" dirty="0"/>
+              <a:rPr lang="en-US" sz="1600" dirty="0"/>
               <a:t>A bonsai is a </a:t>
             </a:r>
             <a:r>
-              <a:rPr lang="en-US" b="1" dirty="0"/>
+              <a:rPr lang="en-US" sz="1600" b="1" dirty="0"/>
               <a:t>living trompe-l’oeil</a:t>
             </a:r>
             <a:r>
-              <a:rPr lang="en-US" dirty="0"/>
+              <a:rPr lang="en-US" sz="1600" dirty="0"/>
               <a:t>: a small tree that appears to be a scaled-down large tree.</a:t>
             </a:r>
           </a:p>
           <a:p>
             <a:r>
-              <a:rPr lang="en-US" dirty="0"/>
+              <a:rPr lang="en-US" sz="1600" dirty="0"/>
               <a:t>Almost any kind of tree can become a bonsai (plus a few things that aren’t trees!)</a:t>
             </a:r>
           </a:p>
           <a:p>
             <a:r>
-              <a:rPr lang="en-US" dirty="0"/>
+              <a:rPr lang="en-US" sz="1600" dirty="0"/>
               <a:t>“Bonsai” traditionally referred to Japanese schools, but has become a generic term</a:t>
             </a:r>
           </a:p>
@@ -6393,25 +6460,25 @@
           </a:p>
           <a:p>
             <a:r>
-              <a:rPr lang="en-GB" dirty="0"/>
+              <a:rPr lang="en-GB" sz="1600" dirty="0"/>
               <a:t>Hands-on education in plant science!</a:t>
             </a:r>
           </a:p>
           <a:p>
             <a:r>
-              <a:rPr lang="en-GB" dirty="0"/>
+              <a:rPr lang="en-GB" sz="1600" dirty="0"/>
               <a:t>Learn to see extra layers of beauty in nature</a:t>
             </a:r>
           </a:p>
           <a:p>
             <a:r>
-              <a:rPr lang="en-GB" dirty="0"/>
+              <a:rPr lang="en-GB" sz="1600" dirty="0"/>
               <a:t>Good practical hobby with interesting culture</a:t>
             </a:r>
           </a:p>
           <a:p>
             <a:r>
-              <a:rPr lang="en-GB" dirty="0"/>
+              <a:rPr lang="en-GB" sz="1600" dirty="0"/>
               <a:t>Sense of control and responsibility</a:t>
             </a:r>
           </a:p>
@@ -6436,8 +6503,8 @@
         </p:nvSpPr>
         <p:spPr>
           <a:xfrm>
-            <a:off x="6198252" y="3862388"/>
-            <a:ext cx="4586288" cy="2386013"/>
+            <a:off x="5715000" y="3862388"/>
+            <a:ext cx="5069540" cy="2484624"/>
           </a:xfrm>
           <a:prstGeom prst="rect">
             <a:avLst/>
@@ -6680,11 +6747,11 @@
             </a:lvl9pPr>
           </a:lstStyle>
           <a:p>
-            <a:pPr marL="0" indent="0">
+            <a:pPr marL="400050" lvl="1" indent="0">
               <a:buNone/>
             </a:pPr>
             <a:r>
-              <a:rPr lang="en-US" sz="2000" i="1" dirty="0">
+              <a:rPr lang="en-US" sz="1800" i="1" dirty="0">
                 <a:solidFill>
                   <a:schemeClr val="accent2"/>
                 </a:solidFill>
@@ -6693,11 +6760,11 @@
             </a:r>
           </a:p>
           <a:p>
-            <a:pPr marL="0" indent="0">
+            <a:pPr marL="400050" lvl="1" indent="0">
               <a:buNone/>
             </a:pPr>
             <a:r>
-              <a:rPr lang="en-US" sz="2000" i="1" dirty="0">
+              <a:rPr lang="en-US" sz="1800" i="1" dirty="0">
                 <a:solidFill>
                   <a:schemeClr val="accent2"/>
                 </a:solidFill>
@@ -6706,11 +6773,11 @@
             </a:r>
           </a:p>
           <a:p>
-            <a:pPr marL="0" indent="0">
+            <a:pPr marL="400050" lvl="1" indent="0">
               <a:buNone/>
             </a:pPr>
             <a:r>
-              <a:rPr lang="en-US" sz="2000" i="1" dirty="0">
+              <a:rPr lang="en-US" sz="1800" i="1" dirty="0">
                 <a:solidFill>
                   <a:schemeClr val="accent2"/>
                 </a:solidFill>
@@ -6719,11 +6786,11 @@
             </a:r>
           </a:p>
           <a:p>
-            <a:pPr marL="0" indent="0">
+            <a:pPr marL="400050" lvl="1" indent="0">
               <a:buNone/>
             </a:pPr>
             <a:r>
-              <a:rPr lang="en-US" sz="2000" i="1" dirty="0">
+              <a:rPr lang="en-US" sz="1800" i="1" dirty="0">
                 <a:solidFill>
                   <a:schemeClr val="accent2"/>
                 </a:solidFill>
@@ -6754,7 +6821,7 @@
     </p:spTree>
     <p:extLst>
       <p:ext uri="{BB962C8B-B14F-4D97-AF65-F5344CB8AC3E}">
-        <p14:creationId xmlns:p14="http://schemas.microsoft.com/office/powerpoint/2010/main" val="3112128634"/>
+        <p14:creationId xmlns:p14="http://schemas.microsoft.com/office/powerpoint/2010/main" val="4029375302"/>
       </p:ext>
     </p:extLst>
   </p:cSld>
@@ -7041,7 +7108,7 @@
     </p:spTree>
     <p:extLst>
       <p:ext uri="{BB962C8B-B14F-4D97-AF65-F5344CB8AC3E}">
-        <p14:creationId xmlns:p14="http://schemas.microsoft.com/office/powerpoint/2010/main" val="3665425383"/>
+        <p14:creationId xmlns:p14="http://schemas.microsoft.com/office/powerpoint/2010/main" val="3993542251"/>
       </p:ext>
     </p:extLst>
   </p:cSld>
@@ -7283,7 +7350,7 @@
     </p:spTree>
     <p:extLst>
       <p:ext uri="{BB962C8B-B14F-4D97-AF65-F5344CB8AC3E}">
-        <p14:creationId xmlns:p14="http://schemas.microsoft.com/office/powerpoint/2010/main" val="4015352413"/>
+        <p14:creationId xmlns:p14="http://schemas.microsoft.com/office/powerpoint/2010/main" val="4121070627"/>
       </p:ext>
     </p:extLst>
   </p:cSld>
@@ -7373,7 +7440,7 @@
     </p:spTree>
     <p:extLst>
       <p:ext uri="{BB962C8B-B14F-4D97-AF65-F5344CB8AC3E}">
-        <p14:creationId xmlns:p14="http://schemas.microsoft.com/office/powerpoint/2010/main" val="768186455"/>
+        <p14:creationId xmlns:p14="http://schemas.microsoft.com/office/powerpoint/2010/main" val="3886614575"/>
       </p:ext>
     </p:extLst>
   </p:cSld>
@@ -7948,7 +8015,7 @@
     </p:spTree>
     <p:extLst>
       <p:ext uri="{BB962C8B-B14F-4D97-AF65-F5344CB8AC3E}">
-        <p14:creationId xmlns:p14="http://schemas.microsoft.com/office/powerpoint/2010/main" val="528860745"/>
+        <p14:creationId xmlns:p14="http://schemas.microsoft.com/office/powerpoint/2010/main" val="501913939"/>
       </p:ext>
     </p:extLst>
   </p:cSld>
@@ -8118,35 +8185,28 @@
           <a:p>
             <a:r>
               <a:rPr lang="en-US" u="sng" dirty="0"/>
-              <a:t>Water!!!!!</a:t>
+              <a:t>Watering!!!!!</a:t>
             </a:r>
           </a:p>
           <a:p>
             <a:pPr lvl="1"/>
             <a:r>
               <a:rPr lang="en-US" dirty="0"/>
-              <a:t>Back-of-hand test</a:t>
+              <a:t>Single biggest killer of bonsai</a:t>
             </a:r>
           </a:p>
           <a:p>
             <a:pPr lvl="1"/>
             <a:r>
               <a:rPr lang="en-US" dirty="0"/>
-              <a:t>Three passes to penetrate fully…</a:t>
+              <a:t>“Root hairs” die easily in drought</a:t>
             </a:r>
           </a:p>
           <a:p>
             <a:pPr lvl="1"/>
             <a:r>
               <a:rPr lang="en-US" dirty="0"/>
-              <a:t>…Or dunk to edge of pot</a:t>
-            </a:r>
-          </a:p>
-          <a:p>
-            <a:pPr lvl="1"/>
-            <a:r>
-              <a:rPr lang="en-US" dirty="0"/>
-              <a:t>Allow to drain fully!</a:t>
+              <a:t>Over-watering is also dangerous!</a:t>
             </a:r>
           </a:p>
           <a:p>
@@ -8280,7 +8340,7 @@
     </p:spTree>
     <p:extLst>
       <p:ext uri="{BB962C8B-B14F-4D97-AF65-F5344CB8AC3E}">
-        <p14:creationId xmlns:p14="http://schemas.microsoft.com/office/powerpoint/2010/main" val="3529928173"/>
+        <p14:creationId xmlns:p14="http://schemas.microsoft.com/office/powerpoint/2010/main" val="3875174907"/>
       </p:ext>
     </p:extLst>
   </p:cSld>
@@ -8309,10 +8369,66 @@
       </p:grpSpPr>
       <p:sp>
         <p:nvSpPr>
+          <p:cNvPr id="4" name="Parallelogram 3">
+            <a:extLst>
+              <a:ext uri="{FF2B5EF4-FFF2-40B4-BE49-F238E27FC236}">
+                <a16:creationId xmlns:a16="http://schemas.microsoft.com/office/drawing/2014/main" id="{B64F6F81-92AB-7C0F-84F7-FAA6E5FC3CF2}"/>
+              </a:ext>
+            </a:extLst>
+          </p:cNvPr>
+          <p:cNvSpPr/>
+          <p:nvPr/>
+        </p:nvSpPr>
+        <p:spPr>
+          <a:xfrm>
+            <a:off x="6833360" y="-18874"/>
+            <a:ext cx="5069541" cy="6876874"/>
+          </a:xfrm>
+          <a:prstGeom prst="parallelogram">
+            <a:avLst>
+              <a:gd name="adj" fmla="val 19695"/>
+            </a:avLst>
+          </a:prstGeom>
+          <a:solidFill>
+            <a:schemeClr val="bg1"/>
+          </a:solidFill>
+          <a:ln>
+            <a:solidFill>
+              <a:schemeClr val="bg1"/>
+            </a:solidFill>
+          </a:ln>
+        </p:spPr>
+        <p:style>
+          <a:lnRef idx="2">
+            <a:schemeClr val="accent1">
+              <a:shade val="15000"/>
+            </a:schemeClr>
+          </a:lnRef>
+          <a:fillRef idx="1">
+            <a:schemeClr val="accent1"/>
+          </a:fillRef>
+          <a:effectRef idx="0">
+            <a:schemeClr val="accent1"/>
+          </a:effectRef>
+          <a:fontRef idx="minor">
+            <a:schemeClr val="lt1"/>
+          </a:fontRef>
+        </p:style>
+        <p:txBody>
+          <a:bodyPr rtlCol="0" anchor="ctr"/>
+          <a:lstStyle/>
+          <a:p>
+            <a:pPr algn="ctr"/>
+            <a:endParaRPr lang="en-GB"/>
+          </a:p>
+        </p:txBody>
+      </p:sp>
+      <p:sp>
+        <p:nvSpPr>
           <p:cNvPr id="2" name="Title 1">
             <a:extLst>
               <a:ext uri="{FF2B5EF4-FFF2-40B4-BE49-F238E27FC236}">
-                <a16:creationId xmlns:a16="http://schemas.microsoft.com/office/drawing/2014/main" id="{C97573B0-7B73-B186-D32F-E842E8D32CFC}"/>
+                <a16:creationId xmlns:a16="http://schemas.microsoft.com/office/drawing/2014/main" id="{701973DA-B0F9-E1A4-AE56-F1BD7BF4C677}"/>
               </a:ext>
             </a:extLst>
           </p:cNvPr>
@@ -8320,33 +8436,236 @@
             <a:spLocks noGrp="1"/>
           </p:cNvSpPr>
           <p:nvPr>
-            <p:ph type="ctrTitle"/>
+            <p:ph type="title"/>
           </p:nvPr>
         </p:nvSpPr>
         <p:spPr/>
         <p:txBody>
-          <a:bodyPr/>
+          <a:bodyPr>
+            <a:normAutofit/>
+          </a:bodyPr>
           <a:lstStyle/>
           <a:p>
             <a:r>
               <a:rPr lang="en-US" dirty="0"/>
-              <a:t>Thanks For Attending!</a:t>
+              <a:t>Watering Your Bonsai</a:t>
             </a:r>
             <a:br>
               <a:rPr lang="en-US" dirty="0"/>
             </a:br>
             <a:r>
-              <a:rPr lang="en-US" sz="4000" dirty="0"/>
-              <a:t>See you next week</a:t>
-            </a:r>
-            <a:endParaRPr lang="en-GB" sz="4000" dirty="0"/>
+              <a:rPr lang="en-US" sz="2800" dirty="0"/>
+              <a:t>No, seriously, this is important</a:t>
+            </a:r>
+            <a:endParaRPr lang="en-GB" sz="2800" dirty="0"/>
+          </a:p>
+        </p:txBody>
+      </p:sp>
+      <p:sp>
+        <p:nvSpPr>
+          <p:cNvPr id="3" name="Content Placeholder 2">
+            <a:extLst>
+              <a:ext uri="{FF2B5EF4-FFF2-40B4-BE49-F238E27FC236}">
+                <a16:creationId xmlns:a16="http://schemas.microsoft.com/office/drawing/2014/main" id="{F7340934-5684-DA8A-A2B6-BA82211E4513}"/>
+              </a:ext>
+            </a:extLst>
+          </p:cNvPr>
+          <p:cNvSpPr>
+            <a:spLocks noGrp="1"/>
+          </p:cNvSpPr>
+          <p:nvPr>
+            <p:ph sz="half" idx="1"/>
+          </p:nvPr>
+        </p:nvSpPr>
+        <p:spPr>
+          <a:xfrm>
+            <a:off x="677334" y="1930400"/>
+            <a:ext cx="5170138" cy="4551081"/>
+          </a:xfrm>
+        </p:spPr>
+        <p:txBody>
+          <a:bodyPr>
+            <a:normAutofit lnSpcReduction="10000"/>
+          </a:bodyPr>
+          <a:lstStyle/>
+          <a:p>
+            <a:pPr marL="0" indent="0">
+              <a:buNone/>
+            </a:pPr>
+            <a:r>
+              <a:rPr lang="en-US" dirty="0"/>
+              <a:t>Why so serious?</a:t>
+            </a:r>
+          </a:p>
+          <a:p>
+            <a:pPr>
+              <a:buFont typeface="+mj-lt"/>
+              <a:buAutoNum type="arabicPeriod"/>
+            </a:pPr>
+            <a:r>
+              <a:rPr lang="en-US" sz="1600" dirty="0"/>
+              <a:t>Trees usually have deep tap-roots to draw water; they don’t handle drying out well</a:t>
+            </a:r>
+          </a:p>
+          <a:p>
+            <a:pPr lvl="1"/>
+            <a:r>
+              <a:rPr lang="en-US" dirty="0"/>
+              <a:t>…Especially conifers, for some reason</a:t>
+            </a:r>
+          </a:p>
+          <a:p>
+            <a:pPr>
+              <a:buFont typeface="+mj-lt"/>
+              <a:buAutoNum type="arabicPeriod"/>
+            </a:pPr>
+            <a:r>
+              <a:rPr lang="en-US" sz="1600" dirty="0"/>
+              <a:t>Good-quality bonsai soils / pots have really good drainage… so can dry off quickly</a:t>
+            </a:r>
+          </a:p>
+          <a:p>
+            <a:pPr>
+              <a:buFont typeface="+mj-lt"/>
+              <a:buAutoNum type="arabicPeriod"/>
+            </a:pPr>
+            <a:r>
+              <a:rPr lang="en-US" sz="1600" dirty="0"/>
+              <a:t>Bonsai soil is very compact and often moss-covered… so water tends to run off the surface</a:t>
+            </a:r>
+          </a:p>
+          <a:p>
+            <a:pPr>
+              <a:buFont typeface="+mj-lt"/>
+              <a:buAutoNum type="arabicPeriod"/>
+            </a:pPr>
+            <a:r>
+              <a:rPr lang="en-US" sz="1600" dirty="0"/>
+              <a:t>Traditional bonsai soil is inorganic, so lacks the “ladders” of plant </a:t>
+            </a:r>
+            <a:r>
+              <a:rPr lang="en-US" sz="1600" dirty="0" err="1"/>
+              <a:t>fibre</a:t>
+            </a:r>
+            <a:r>
+              <a:rPr lang="en-US" sz="1600" dirty="0"/>
+              <a:t> that let water rise up through the pot</a:t>
+            </a:r>
+          </a:p>
+          <a:p>
+            <a:pPr>
+              <a:buFont typeface="+mj-lt"/>
+              <a:buAutoNum type="arabicPeriod"/>
+            </a:pPr>
+            <a:r>
+              <a:rPr lang="en-US" sz="1600" dirty="0"/>
+              <a:t>Even gardening experts routinely kill their first bonsai!</a:t>
+            </a:r>
+          </a:p>
+          <a:p>
+            <a:endParaRPr lang="en-GB" dirty="0"/>
+          </a:p>
+        </p:txBody>
+      </p:sp>
+      <p:sp>
+        <p:nvSpPr>
+          <p:cNvPr id="5" name="Content Placeholder 4">
+            <a:extLst>
+              <a:ext uri="{FF2B5EF4-FFF2-40B4-BE49-F238E27FC236}">
+                <a16:creationId xmlns:a16="http://schemas.microsoft.com/office/drawing/2014/main" id="{A5173260-C06C-E64C-308E-C5B49B4F82EC}"/>
+              </a:ext>
+            </a:extLst>
+          </p:cNvPr>
+          <p:cNvSpPr>
+            <a:spLocks noGrp="1"/>
+          </p:cNvSpPr>
+          <p:nvPr>
+            <p:ph sz="half" idx="2"/>
+          </p:nvPr>
+        </p:nvSpPr>
+        <p:spPr>
+          <a:xfrm>
+            <a:off x="5847472" y="1930400"/>
+            <a:ext cx="5170137" cy="4551082"/>
+          </a:xfrm>
+        </p:spPr>
+        <p:txBody>
+          <a:bodyPr>
+            <a:normAutofit lnSpcReduction="10000"/>
+          </a:bodyPr>
+          <a:lstStyle/>
+          <a:p>
+            <a:pPr marL="0" indent="0">
+              <a:buNone/>
+            </a:pPr>
+            <a:r>
+              <a:rPr lang="en-US" dirty="0"/>
+              <a:t>Watering methods</a:t>
+            </a:r>
+          </a:p>
+          <a:p>
+            <a:r>
+              <a:rPr lang="en-GB" sz="1600" dirty="0"/>
+              <a:t>Put in bucket of water (to just below brim) and wait for water to bubble up</a:t>
+            </a:r>
+          </a:p>
+          <a:p>
+            <a:pPr lvl="1"/>
+            <a:r>
+              <a:rPr lang="en-GB" dirty="0"/>
+              <a:t>…Then take out and allow to drain fully.  </a:t>
+            </a:r>
+            <a:r>
+              <a:rPr lang="en-GB" i="1" dirty="0"/>
+              <a:t>Never</a:t>
+            </a:r>
+            <a:r>
+              <a:rPr lang="en-GB" dirty="0"/>
+              <a:t> leave standing in water for long periods – roots need oxygen too!</a:t>
+            </a:r>
+          </a:p>
+          <a:p>
+            <a:r>
+              <a:rPr lang="en-GB" sz="1600" dirty="0"/>
+              <a:t>Water from above three times, allowing the water to sink in between passes</a:t>
+            </a:r>
+          </a:p>
+          <a:p>
+            <a:endParaRPr lang="en-GB" dirty="0"/>
+          </a:p>
+          <a:p>
+            <a:pPr marL="0" indent="0">
+              <a:buNone/>
+            </a:pPr>
+            <a:r>
+              <a:rPr lang="en-GB" dirty="0"/>
+              <a:t>Is it watered enough?</a:t>
+            </a:r>
+          </a:p>
+          <a:p>
+            <a:r>
+              <a:rPr lang="en-GB" sz="1600" dirty="0"/>
+              <a:t>Surface feels damp to back of hand</a:t>
+            </a:r>
+          </a:p>
+          <a:p>
+            <a:r>
+              <a:rPr lang="en-GB" sz="1600" dirty="0"/>
+              <a:t>Pot significantly heavier</a:t>
+            </a:r>
+          </a:p>
+          <a:p>
+            <a:r>
+              <a:rPr lang="en-GB" sz="1600" dirty="0"/>
+              <a:t>Water running out of hole in bottom when more is added</a:t>
+            </a:r>
           </a:p>
         </p:txBody>
       </p:sp>
     </p:spTree>
     <p:extLst>
       <p:ext uri="{BB962C8B-B14F-4D97-AF65-F5344CB8AC3E}">
-        <p14:creationId xmlns:p14="http://schemas.microsoft.com/office/powerpoint/2010/main" val="2843185871"/>
+        <p14:creationId xmlns:p14="http://schemas.microsoft.com/office/powerpoint/2010/main" val="757055823"/>
       </p:ext>
     </p:extLst>
   </p:cSld>

</xml_diff>

<commit_message>
Added "when to water" slide to running deck Cross-updated event deck
</commit_message>
<xml_diff>
--- a/Courseware/Bonsai Evening A (2024-07-04).pptx
+++ b/Courseware/Bonsai Evening A (2024-07-04).pptx
@@ -17,6 +17,7 @@
     <p:sldId id="276" r:id="rId11"/>
     <p:sldId id="278" r:id="rId12"/>
     <p:sldId id="290" r:id="rId13"/>
+    <p:sldId id="291" r:id="rId14"/>
   </p:sldIdLst>
   <p:sldSz cx="12192000" cy="6858000"/>
   <p:notesSz cx="6858000" cy="9144000"/>
@@ -852,7 +853,7 @@
             <a:fld id="{B61BEF0D-F0BB-DE4B-95CE-6DB70DBA9567}" type="datetimeFigureOut">
               <a:rPr lang="en-US" smtClean="0"/>
               <a:pPr/>
-              <a:t>7/3/2024</a:t>
+              <a:t>7/4/2024</a:t>
             </a:fld>
             <a:endParaRPr lang="en-US" dirty="0"/>
           </a:p>
@@ -1105,7 +1106,7 @@
             <a:fld id="{B61BEF0D-F0BB-DE4B-95CE-6DB70DBA9567}" type="datetimeFigureOut">
               <a:rPr lang="en-US" smtClean="0"/>
               <a:pPr/>
-              <a:t>7/3/2024</a:t>
+              <a:t>7/4/2024</a:t>
             </a:fld>
             <a:endParaRPr lang="en-US" dirty="0"/>
           </a:p>
@@ -1421,7 +1422,7 @@
             <a:fld id="{B61BEF0D-F0BB-DE4B-95CE-6DB70DBA9567}" type="datetimeFigureOut">
               <a:rPr lang="en-US" smtClean="0"/>
               <a:pPr/>
-              <a:t>7/3/2024</a:t>
+              <a:t>7/4/2024</a:t>
             </a:fld>
             <a:endParaRPr lang="en-US" dirty="0"/>
           </a:p>
@@ -1764,7 +1765,7 @@
             <a:fld id="{B61BEF0D-F0BB-DE4B-95CE-6DB70DBA9567}" type="datetimeFigureOut">
               <a:rPr lang="en-US" smtClean="0"/>
               <a:pPr/>
-              <a:t>7/3/2024</a:t>
+              <a:t>7/4/2024</a:t>
             </a:fld>
             <a:endParaRPr lang="en-US" dirty="0"/>
           </a:p>
@@ -2080,7 +2081,7 @@
             <a:fld id="{B61BEF0D-F0BB-DE4B-95CE-6DB70DBA9567}" type="datetimeFigureOut">
               <a:rPr lang="en-US" smtClean="0"/>
               <a:pPr/>
-              <a:t>7/3/2024</a:t>
+              <a:t>7/4/2024</a:t>
             </a:fld>
             <a:endParaRPr lang="en-US" dirty="0"/>
           </a:p>
@@ -2475,7 +2476,7 @@
             <a:fld id="{B61BEF0D-F0BB-DE4B-95CE-6DB70DBA9567}" type="datetimeFigureOut">
               <a:rPr lang="en-US" smtClean="0"/>
               <a:pPr/>
-              <a:t>7/3/2024</a:t>
+              <a:t>7/4/2024</a:t>
             </a:fld>
             <a:endParaRPr lang="en-US" dirty="0"/>
           </a:p>
@@ -2646,7 +2647,7 @@
           <a:p>
             <a:fld id="{55C6B4A9-1611-4792-9094-5F34BCA07E0B}" type="datetimeFigureOut">
               <a:rPr lang="en-US" smtClean="0"/>
-              <a:t>7/3/2024</a:t>
+              <a:t>7/4/2024</a:t>
             </a:fld>
             <a:endParaRPr lang="en-US" dirty="0"/>
           </a:p>
@@ -2827,7 +2828,7 @@
             <a:fld id="{B61BEF0D-F0BB-DE4B-95CE-6DB70DBA9567}" type="datetimeFigureOut">
               <a:rPr lang="en-US" smtClean="0"/>
               <a:pPr/>
-              <a:t>7/3/2024</a:t>
+              <a:t>7/4/2024</a:t>
             </a:fld>
             <a:endParaRPr lang="en-US" dirty="0"/>
           </a:p>
@@ -3005,7 +3006,7 @@
             <a:fld id="{B61BEF0D-F0BB-DE4B-95CE-6DB70DBA9567}" type="datetimeFigureOut">
               <a:rPr lang="en-US" smtClean="0"/>
               <a:pPr/>
-              <a:t>7/3/2024</a:t>
+              <a:t>7/4/2024</a:t>
             </a:fld>
             <a:endParaRPr lang="en-US" dirty="0"/>
           </a:p>
@@ -3254,7 +3255,7 @@
             <a:fld id="{B61BEF0D-F0BB-DE4B-95CE-6DB70DBA9567}" type="datetimeFigureOut">
               <a:rPr lang="en-US" smtClean="0"/>
               <a:pPr/>
-              <a:t>7/3/2024</a:t>
+              <a:t>7/4/2024</a:t>
             </a:fld>
             <a:endParaRPr lang="en-US" dirty="0"/>
           </a:p>
@@ -3487,7 +3488,7 @@
           <a:p>
             <a:fld id="{EB712588-04B1-427B-82EE-E8DB90309F08}" type="datetimeFigureOut">
               <a:rPr lang="en-US" smtClean="0"/>
-              <a:t>7/3/2024</a:t>
+              <a:t>7/4/2024</a:t>
             </a:fld>
             <a:endParaRPr lang="en-US" dirty="0"/>
           </a:p>
@@ -3862,7 +3863,7 @@
             <a:fld id="{B61BEF0D-F0BB-DE4B-95CE-6DB70DBA9567}" type="datetimeFigureOut">
               <a:rPr lang="en-US" smtClean="0"/>
               <a:pPr/>
-              <a:t>7/3/2024</a:t>
+              <a:t>7/4/2024</a:t>
             </a:fld>
             <a:endParaRPr lang="en-US" dirty="0"/>
           </a:p>
@@ -3987,7 +3988,7 @@
             <a:fld id="{B61BEF0D-F0BB-DE4B-95CE-6DB70DBA9567}" type="datetimeFigureOut">
               <a:rPr lang="en-US" smtClean="0"/>
               <a:pPr/>
-              <a:t>7/3/2024</a:t>
+              <a:t>7/4/2024</a:t>
             </a:fld>
             <a:endParaRPr lang="en-US" dirty="0"/>
           </a:p>
@@ -4084,7 +4085,7 @@
             <a:fld id="{B61BEF0D-F0BB-DE4B-95CE-6DB70DBA9567}" type="datetimeFigureOut">
               <a:rPr lang="en-US" smtClean="0"/>
               <a:pPr/>
-              <a:t>7/3/2024</a:t>
+              <a:t>7/4/2024</a:t>
             </a:fld>
             <a:endParaRPr lang="en-US" dirty="0"/>
           </a:p>
@@ -4340,7 +4341,7 @@
           <a:p>
             <a:fld id="{42A54C80-263E-416B-A8E0-580EDEADCBDC}" type="datetimeFigureOut">
               <a:rPr lang="en-US" smtClean="0"/>
-              <a:t>7/3/2024</a:t>
+              <a:t>7/4/2024</a:t>
             </a:fld>
             <a:endParaRPr lang="en-US" dirty="0"/>
           </a:p>
@@ -4604,7 +4605,7 @@
             <a:fld id="{B61BEF0D-F0BB-DE4B-95CE-6DB70DBA9567}" type="datetimeFigureOut">
               <a:rPr lang="en-US" smtClean="0"/>
               <a:pPr/>
-              <a:t>7/3/2024</a:t>
+              <a:t>7/4/2024</a:t>
             </a:fld>
             <a:endParaRPr lang="en-US" dirty="0"/>
           </a:p>
@@ -5349,7 +5350,7 @@
             <a:fld id="{B61BEF0D-F0BB-DE4B-95CE-6DB70DBA9567}" type="datetimeFigureOut">
               <a:rPr lang="en-US" smtClean="0"/>
               <a:pPr/>
-              <a:t>7/3/2024</a:t>
+              <a:t>7/4/2024</a:t>
             </a:fld>
             <a:endParaRPr lang="en-US" dirty="0"/>
           </a:p>
@@ -11718,6 +11719,324 @@
 </p:sld>
 </file>
 
+<file path=ppt/slides/slide13.xml><?xml version="1.0" encoding="utf-8"?>
+<p:sld xmlns:a="http://schemas.openxmlformats.org/drawingml/2006/main" xmlns:r="http://schemas.openxmlformats.org/officeDocument/2006/relationships" xmlns:p="http://schemas.openxmlformats.org/presentationml/2006/main">
+  <p:cSld>
+    <p:spTree>
+      <p:nvGrpSpPr>
+        <p:cNvPr id="1" name=""/>
+        <p:cNvGrpSpPr/>
+        <p:nvPr/>
+      </p:nvGrpSpPr>
+      <p:grpSpPr>
+        <a:xfrm>
+          <a:off x="0" y="0"/>
+          <a:ext cx="0" cy="0"/>
+          <a:chOff x="0" y="0"/>
+          <a:chExt cx="0" cy="0"/>
+        </a:xfrm>
+      </p:grpSpPr>
+      <p:sp>
+        <p:nvSpPr>
+          <p:cNvPr id="4" name="Parallelogram 3">
+            <a:extLst>
+              <a:ext uri="{FF2B5EF4-FFF2-40B4-BE49-F238E27FC236}">
+                <a16:creationId xmlns:a16="http://schemas.microsoft.com/office/drawing/2014/main" id="{B64F6F81-92AB-7C0F-84F7-FAA6E5FC3CF2}"/>
+              </a:ext>
+            </a:extLst>
+          </p:cNvPr>
+          <p:cNvSpPr/>
+          <p:nvPr/>
+        </p:nvSpPr>
+        <p:spPr>
+          <a:xfrm>
+            <a:off x="6833360" y="-18874"/>
+            <a:ext cx="5069541" cy="6876874"/>
+          </a:xfrm>
+          <a:prstGeom prst="parallelogram">
+            <a:avLst>
+              <a:gd name="adj" fmla="val 19695"/>
+            </a:avLst>
+          </a:prstGeom>
+          <a:solidFill>
+            <a:schemeClr val="bg1"/>
+          </a:solidFill>
+          <a:ln>
+            <a:solidFill>
+              <a:schemeClr val="bg1"/>
+            </a:solidFill>
+          </a:ln>
+        </p:spPr>
+        <p:style>
+          <a:lnRef idx="2">
+            <a:schemeClr val="accent1">
+              <a:shade val="15000"/>
+            </a:schemeClr>
+          </a:lnRef>
+          <a:fillRef idx="1">
+            <a:schemeClr val="accent1"/>
+          </a:fillRef>
+          <a:effectRef idx="0">
+            <a:schemeClr val="accent1"/>
+          </a:effectRef>
+          <a:fontRef idx="minor">
+            <a:schemeClr val="lt1"/>
+          </a:fontRef>
+        </p:style>
+        <p:txBody>
+          <a:bodyPr rtlCol="0" anchor="ctr"/>
+          <a:lstStyle/>
+          <a:p>
+            <a:pPr algn="ctr"/>
+            <a:endParaRPr lang="en-GB"/>
+          </a:p>
+        </p:txBody>
+      </p:sp>
+      <p:sp>
+        <p:nvSpPr>
+          <p:cNvPr id="2" name="Title 1">
+            <a:extLst>
+              <a:ext uri="{FF2B5EF4-FFF2-40B4-BE49-F238E27FC236}">
+                <a16:creationId xmlns:a16="http://schemas.microsoft.com/office/drawing/2014/main" id="{701973DA-B0F9-E1A4-AE56-F1BD7BF4C677}"/>
+              </a:ext>
+            </a:extLst>
+          </p:cNvPr>
+          <p:cNvSpPr>
+            <a:spLocks noGrp="1"/>
+          </p:cNvSpPr>
+          <p:nvPr>
+            <p:ph type="title"/>
+          </p:nvPr>
+        </p:nvSpPr>
+        <p:spPr/>
+        <p:txBody>
+          <a:bodyPr>
+            <a:normAutofit/>
+          </a:bodyPr>
+          <a:lstStyle/>
+          <a:p>
+            <a:r>
+              <a:rPr lang="en-US" dirty="0"/>
+              <a:t>How Often To Water</a:t>
+            </a:r>
+            <a:br>
+              <a:rPr lang="en-US" dirty="0"/>
+            </a:br>
+            <a:r>
+              <a:rPr lang="en-US" sz="2800" dirty="0"/>
+              <a:t>Some key factors</a:t>
+            </a:r>
+            <a:endParaRPr lang="en-GB" sz="2800" dirty="0"/>
+          </a:p>
+        </p:txBody>
+      </p:sp>
+      <p:sp>
+        <p:nvSpPr>
+          <p:cNvPr id="5" name="Content Placeholder 4">
+            <a:extLst>
+              <a:ext uri="{FF2B5EF4-FFF2-40B4-BE49-F238E27FC236}">
+                <a16:creationId xmlns:a16="http://schemas.microsoft.com/office/drawing/2014/main" id="{40D4EA2C-3624-B6E0-1DEB-32887D9DA8B4}"/>
+              </a:ext>
+            </a:extLst>
+          </p:cNvPr>
+          <p:cNvSpPr>
+            <a:spLocks noGrp="1"/>
+          </p:cNvSpPr>
+          <p:nvPr>
+            <p:ph sz="half" idx="1"/>
+          </p:nvPr>
+        </p:nvSpPr>
+        <p:spPr>
+          <a:xfrm>
+            <a:off x="677334" y="1930400"/>
+            <a:ext cx="4184035" cy="4752788"/>
+          </a:xfrm>
+        </p:spPr>
+        <p:txBody>
+          <a:bodyPr>
+            <a:normAutofit/>
+          </a:bodyPr>
+          <a:lstStyle/>
+          <a:p>
+            <a:pPr marL="0" indent="0">
+              <a:buNone/>
+            </a:pPr>
+            <a:r>
+              <a:rPr lang="en-US" dirty="0"/>
+              <a:t>Pot</a:t>
+            </a:r>
+          </a:p>
+          <a:p>
+            <a:r>
+              <a:rPr lang="en-US" sz="1600" dirty="0"/>
+              <a:t>Depth: deep = less frequent</a:t>
+            </a:r>
+          </a:p>
+          <a:p>
+            <a:r>
+              <a:rPr lang="en-US" sz="1600" dirty="0"/>
+              <a:t>Shape: bulbous = less, fluting = more</a:t>
+            </a:r>
+          </a:p>
+          <a:p>
+            <a:r>
+              <a:rPr lang="en-US" sz="1600" dirty="0"/>
+              <a:t>Inner surface: glazed = more</a:t>
+            </a:r>
+            <a:endParaRPr lang="en-US" dirty="0"/>
+          </a:p>
+          <a:p>
+            <a:pPr marL="0" indent="0">
+              <a:buNone/>
+            </a:pPr>
+            <a:r>
+              <a:rPr lang="en-US" dirty="0"/>
+              <a:t>Soil</a:t>
+            </a:r>
+          </a:p>
+          <a:p>
+            <a:r>
+              <a:rPr lang="en-US" sz="1600" dirty="0"/>
+              <a:t>Drainage: well-draining = more</a:t>
+            </a:r>
+          </a:p>
+          <a:p>
+            <a:r>
+              <a:rPr lang="en-US" sz="1600" dirty="0"/>
+              <a:t>Degradation: older = harder to water</a:t>
+            </a:r>
+            <a:endParaRPr lang="en-US" dirty="0"/>
+          </a:p>
+          <a:p>
+            <a:pPr marL="0" indent="0">
+              <a:buNone/>
+            </a:pPr>
+            <a:r>
+              <a:rPr lang="en-US" dirty="0"/>
+              <a:t>Tree</a:t>
+            </a:r>
+          </a:p>
+          <a:p>
+            <a:r>
+              <a:rPr lang="en-US" sz="1600" dirty="0"/>
+              <a:t>Maturity: older = less (in theory)</a:t>
+            </a:r>
+          </a:p>
+          <a:p>
+            <a:r>
+              <a:rPr lang="en-US" sz="1600" dirty="0" err="1"/>
+              <a:t>Fertilisation</a:t>
+            </a:r>
+            <a:r>
+              <a:rPr lang="en-US" sz="1600" dirty="0"/>
+              <a:t>: heavy = more</a:t>
+            </a:r>
+          </a:p>
+          <a:p>
+            <a:r>
+              <a:rPr lang="en-US" sz="1600" dirty="0"/>
+              <a:t>Re-potting: recent = more</a:t>
+            </a:r>
+            <a:endParaRPr lang="en-GB" sz="1600" dirty="0"/>
+          </a:p>
+        </p:txBody>
+      </p:sp>
+      <p:sp>
+        <p:nvSpPr>
+          <p:cNvPr id="6" name="Content Placeholder 5">
+            <a:extLst>
+              <a:ext uri="{FF2B5EF4-FFF2-40B4-BE49-F238E27FC236}">
+                <a16:creationId xmlns:a16="http://schemas.microsoft.com/office/drawing/2014/main" id="{9103B85F-8084-17B5-B8E1-5DD9D4E7BA15}"/>
+              </a:ext>
+            </a:extLst>
+          </p:cNvPr>
+          <p:cNvSpPr>
+            <a:spLocks noGrp="1"/>
+          </p:cNvSpPr>
+          <p:nvPr>
+            <p:ph sz="half" idx="2"/>
+          </p:nvPr>
+        </p:nvSpPr>
+        <p:spPr>
+          <a:xfrm>
+            <a:off x="5089970" y="1930400"/>
+            <a:ext cx="4184034" cy="4752789"/>
+          </a:xfrm>
+        </p:spPr>
+        <p:txBody>
+          <a:bodyPr>
+            <a:normAutofit/>
+          </a:bodyPr>
+          <a:lstStyle/>
+          <a:p>
+            <a:pPr marL="0" indent="0">
+              <a:buNone/>
+            </a:pPr>
+            <a:r>
+              <a:rPr lang="en-US" dirty="0"/>
+              <a:t>Environment</a:t>
+            </a:r>
+          </a:p>
+          <a:p>
+            <a:r>
+              <a:rPr lang="en-US" sz="1600" dirty="0"/>
+              <a:t>Wind: windier = more</a:t>
+            </a:r>
+          </a:p>
+          <a:p>
+            <a:r>
+              <a:rPr lang="en-US" sz="1600" dirty="0"/>
+              <a:t>Sun: sunny = more, shady = less</a:t>
+            </a:r>
+          </a:p>
+          <a:p>
+            <a:r>
+              <a:rPr lang="en-US" sz="1600" dirty="0"/>
+              <a:t>Heat: hotter = more, colder = less</a:t>
+            </a:r>
+          </a:p>
+          <a:p>
+            <a:r>
+              <a:rPr lang="en-US" sz="1600" dirty="0"/>
+              <a:t>Season: Winter = least, Summer = most</a:t>
+            </a:r>
+          </a:p>
+          <a:p>
+            <a:r>
+              <a:rPr lang="en-US" sz="1600" dirty="0"/>
+              <a:t>Warning: these factors are “non-linear”!  For example: double the sun can mean 4x the water.</a:t>
+            </a:r>
+          </a:p>
+          <a:p>
+            <a:pPr marL="0" indent="0">
+              <a:buNone/>
+            </a:pPr>
+            <a:endParaRPr lang="en-US" sz="1600" dirty="0"/>
+          </a:p>
+          <a:p>
+            <a:pPr marL="0" indent="0">
+              <a:buNone/>
+            </a:pPr>
+            <a:r>
+              <a:rPr lang="en-US" dirty="0"/>
+              <a:t>…Mostly it’s not worth the effort to figure out the “right” watering frequency.  Just keep checking the pot every day!</a:t>
+            </a:r>
+          </a:p>
+        </p:txBody>
+      </p:sp>
+    </p:spTree>
+    <p:extLst>
+      <p:ext uri="{BB962C8B-B14F-4D97-AF65-F5344CB8AC3E}">
+        <p14:creationId xmlns:p14="http://schemas.microsoft.com/office/powerpoint/2010/main" val="1898086529"/>
+      </p:ext>
+    </p:extLst>
+  </p:cSld>
+  <p:clrMapOvr>
+    <a:masterClrMapping/>
+  </p:clrMapOvr>
+</p:sld>
+</file>
+
 <file path=ppt/slides/slide2.xml><?xml version="1.0" encoding="utf-8"?>
 <p:sld xmlns:a="http://schemas.openxmlformats.org/drawingml/2006/main" xmlns:r="http://schemas.openxmlformats.org/officeDocument/2006/relationships" xmlns:p="http://schemas.openxmlformats.org/presentationml/2006/main">
   <p:cSld>

</xml_diff>

<commit_message>
Corrected wiring diagram slide in running deck (Previous version was a dodgy hybrid of single-hole and two-hole wiring) Added moss to "when to water" list Cross-updated event deck
</commit_message>
<xml_diff>
--- a/Courseware/Bonsai Evening A (2024-07-04).pptx
+++ b/Courseware/Bonsai Evening A (2024-07-04).pptx
@@ -6163,7 +6163,7 @@
         </p:nvSpPr>
         <p:spPr>
           <a:xfrm>
-            <a:off x="6833360" y="-18874"/>
+            <a:off x="6642709" y="-310166"/>
             <a:ext cx="5069541" cy="6876874"/>
           </a:xfrm>
           <a:prstGeom prst="parallelogram">
@@ -6201,7 +6201,7 @@
           <a:lstStyle/>
           <a:p>
             <a:pPr algn="ctr"/>
-            <a:endParaRPr lang="en-GB"/>
+            <a:endParaRPr lang="en-GB" dirty="0"/>
           </a:p>
         </p:txBody>
       </p:sp>
@@ -6371,8 +6371,8 @@
           <p:nvPr/>
         </p:nvSpPr>
         <p:spPr>
-          <a:xfrm>
-            <a:off x="1876161" y="3281220"/>
+          <a:xfrm rot="5400000">
+            <a:off x="1862715" y="3294667"/>
             <a:ext cx="943896" cy="943896"/>
           </a:xfrm>
           <a:prstGeom prst="ellipse">
@@ -6431,8 +6431,8 @@
           <p:nvPr/>
         </p:nvSpPr>
         <p:spPr>
-          <a:xfrm>
-            <a:off x="2011933" y="3416992"/>
+          <a:xfrm rot="5400000">
+            <a:off x="1998486" y="3430439"/>
             <a:ext cx="672353" cy="672353"/>
           </a:xfrm>
           <a:prstGeom prst="ellipse">
@@ -6485,13 +6485,14 @@
             </a:extLst>
           </p:cNvPr>
           <p:cNvCxnSpPr>
+            <a:cxnSpLocks/>
             <a:stCxn id="9" idx="2"/>
           </p:cNvCxnSpPr>
           <p:nvPr/>
         </p:nvCxnSpPr>
         <p:spPr>
-          <a:xfrm flipV="1">
-            <a:off x="2011933" y="3753168"/>
+          <a:xfrm rot="5400000" flipV="1">
+            <a:off x="1998486" y="3766615"/>
             <a:ext cx="672353" cy="1"/>
           </a:xfrm>
           <a:prstGeom prst="line">
@@ -6533,8 +6534,8 @@
           <p:nvPr/>
         </p:nvCxnSpPr>
         <p:spPr>
-          <a:xfrm>
-            <a:off x="2630499" y="3753167"/>
+          <a:xfrm rot="5400000">
+            <a:off x="2171999" y="4211670"/>
             <a:ext cx="325330" cy="0"/>
           </a:xfrm>
           <a:prstGeom prst="line">
@@ -6578,8 +6579,8 @@
           <p:nvPr/>
         </p:nvCxnSpPr>
         <p:spPr>
-          <a:xfrm>
-            <a:off x="1713496" y="3752694"/>
+          <a:xfrm rot="5400000">
+            <a:off x="2172472" y="3294667"/>
             <a:ext cx="325330" cy="0"/>
           </a:xfrm>
           <a:prstGeom prst="line">
@@ -7007,8 +7008,8 @@
           <p:nvPr/>
         </p:nvSpPr>
         <p:spPr>
-          <a:xfrm>
-            <a:off x="6361410" y="3281220"/>
+          <a:xfrm rot="5400000">
+            <a:off x="6347964" y="3294667"/>
             <a:ext cx="943896" cy="943896"/>
           </a:xfrm>
           <a:prstGeom prst="ellipse">
@@ -7067,8 +7068,8 @@
           <p:nvPr/>
         </p:nvSpPr>
         <p:spPr>
-          <a:xfrm>
-            <a:off x="6497182" y="3416992"/>
+          <a:xfrm rot="5400000">
+            <a:off x="6483735" y="3430439"/>
             <a:ext cx="672353" cy="672353"/>
           </a:xfrm>
           <a:prstGeom prst="ellipse">
@@ -7126,8 +7127,8 @@
           <p:nvPr/>
         </p:nvCxnSpPr>
         <p:spPr>
-          <a:xfrm flipV="1">
-            <a:off x="6497182" y="3753168"/>
+          <a:xfrm rot="5400000" flipV="1">
+            <a:off x="6483735" y="3766615"/>
             <a:ext cx="672353" cy="1"/>
           </a:xfrm>
           <a:prstGeom prst="line">
@@ -7169,8 +7170,8 @@
           <p:nvPr/>
         </p:nvCxnSpPr>
         <p:spPr>
-          <a:xfrm>
-            <a:off x="7115748" y="3753167"/>
+          <a:xfrm rot="5400000">
+            <a:off x="6657248" y="4211670"/>
             <a:ext cx="325330" cy="0"/>
           </a:xfrm>
           <a:prstGeom prst="line">
@@ -7214,8 +7215,8 @@
           <p:nvPr/>
         </p:nvCxnSpPr>
         <p:spPr>
-          <a:xfrm>
-            <a:off x="6198745" y="3752694"/>
+          <a:xfrm rot="5400000">
+            <a:off x="6657721" y="3294667"/>
             <a:ext cx="325330" cy="0"/>
           </a:xfrm>
           <a:prstGeom prst="line">
@@ -8111,8 +8112,8 @@
         </p:nvCxnSpPr>
         <p:spPr>
           <a:xfrm flipH="1">
-            <a:off x="1823131" y="2809491"/>
-            <a:ext cx="1387326" cy="914449"/>
+            <a:off x="2386571" y="2809491"/>
+            <a:ext cx="823886" cy="396076"/>
           </a:xfrm>
           <a:prstGeom prst="straightConnector1">
             <a:avLst/>
@@ -8152,8 +8153,8 @@
         </p:nvCxnSpPr>
         <p:spPr>
           <a:xfrm flipH="1">
-            <a:off x="2869995" y="2814263"/>
-            <a:ext cx="718645" cy="938431"/>
+            <a:off x="2386571" y="2814263"/>
+            <a:ext cx="1202069" cy="1487281"/>
           </a:xfrm>
           <a:prstGeom prst="straightConnector1">
             <a:avLst/>
@@ -8192,54 +8193,9 @@
           <p:nvPr/>
         </p:nvCxnSpPr>
         <p:spPr>
-          <a:xfrm>
-            <a:off x="6543925" y="3687484"/>
-            <a:ext cx="566912" cy="0"/>
-          </a:xfrm>
-          <a:prstGeom prst="line">
-            <a:avLst/>
-          </a:prstGeom>
-          <a:ln w="31750">
-            <a:solidFill>
-              <a:schemeClr val="accent3">
-                <a:lumMod val="50000"/>
-              </a:schemeClr>
-            </a:solidFill>
-          </a:ln>
-        </p:spPr>
-        <p:style>
-          <a:lnRef idx="1">
-            <a:schemeClr val="accent1"/>
-          </a:lnRef>
-          <a:fillRef idx="0">
-            <a:schemeClr val="accent1"/>
-          </a:fillRef>
-          <a:effectRef idx="0">
-            <a:schemeClr val="accent1"/>
-          </a:effectRef>
-          <a:fontRef idx="minor">
-            <a:schemeClr val="tx1"/>
-          </a:fontRef>
-        </p:style>
-      </p:cxnSp>
-      <p:cxnSp>
-        <p:nvCxnSpPr>
-          <p:cNvPr id="51" name="Straight Connector 50">
-            <a:extLst>
-              <a:ext uri="{FF2B5EF4-FFF2-40B4-BE49-F238E27FC236}">
-                <a16:creationId xmlns:a16="http://schemas.microsoft.com/office/drawing/2014/main" id="{FD8D3F51-1C88-AE8D-A3A2-F2EE6D1B06AD}"/>
-              </a:ext>
-            </a:extLst>
-          </p:cNvPr>
-          <p:cNvCxnSpPr>
-            <a:cxnSpLocks/>
-          </p:cNvCxnSpPr>
-          <p:nvPr/>
-        </p:nvCxnSpPr>
-        <p:spPr>
-          <a:xfrm>
-            <a:off x="6543925" y="3831933"/>
-            <a:ext cx="566912" cy="0"/>
+          <a:xfrm flipV="1">
+            <a:off x="6653263" y="3562059"/>
+            <a:ext cx="337565" cy="2161"/>
           </a:xfrm>
           <a:prstGeom prst="line">
             <a:avLst/>
@@ -8283,50 +8239,7 @@
         </p:nvCxnSpPr>
         <p:spPr>
           <a:xfrm>
-            <a:off x="5058188" y="3459027"/>
-            <a:ext cx="1476264" cy="230420"/>
-          </a:xfrm>
-          <a:prstGeom prst="line">
-            <a:avLst/>
-          </a:prstGeom>
-          <a:ln w="31750">
-            <a:solidFill>
-              <a:schemeClr val="accent3"/>
-            </a:solidFill>
-          </a:ln>
-        </p:spPr>
-        <p:style>
-          <a:lnRef idx="1">
-            <a:schemeClr val="accent1"/>
-          </a:lnRef>
-          <a:fillRef idx="0">
-            <a:schemeClr val="accent1"/>
-          </a:fillRef>
-          <a:effectRef idx="0">
-            <a:schemeClr val="accent1"/>
-          </a:effectRef>
-          <a:fontRef idx="minor">
-            <a:schemeClr val="tx1"/>
-          </a:fontRef>
-        </p:style>
-      </p:cxnSp>
-      <p:cxnSp>
-        <p:nvCxnSpPr>
-          <p:cNvPr id="56" name="Straight Connector 55">
-            <a:extLst>
-              <a:ext uri="{FF2B5EF4-FFF2-40B4-BE49-F238E27FC236}">
-                <a16:creationId xmlns:a16="http://schemas.microsoft.com/office/drawing/2014/main" id="{77FBE1BC-19E6-EAB0-5D8C-5A1AF5C58654}"/>
-              </a:ext>
-            </a:extLst>
-          </p:cNvPr>
-          <p:cNvCxnSpPr>
-            <a:cxnSpLocks/>
-          </p:cNvCxnSpPr>
-          <p:nvPr/>
-        </p:nvCxnSpPr>
-        <p:spPr>
-          <a:xfrm flipV="1">
-            <a:off x="5058188" y="3837942"/>
+            <a:off x="5174274" y="3330703"/>
             <a:ext cx="1476264" cy="230420"/>
           </a:xfrm>
           <a:prstGeom prst="line">
@@ -8369,50 +8282,7 @@
         </p:nvCxnSpPr>
         <p:spPr>
           <a:xfrm flipH="1">
-            <a:off x="7108621" y="3459027"/>
-            <a:ext cx="1939464" cy="226296"/>
-          </a:xfrm>
-          <a:prstGeom prst="line">
-            <a:avLst/>
-          </a:prstGeom>
-          <a:ln w="31750">
-            <a:solidFill>
-              <a:schemeClr val="accent3"/>
-            </a:solidFill>
-          </a:ln>
-        </p:spPr>
-        <p:style>
-          <a:lnRef idx="1">
-            <a:schemeClr val="accent1"/>
-          </a:lnRef>
-          <a:fillRef idx="0">
-            <a:schemeClr val="accent1"/>
-          </a:fillRef>
-          <a:effectRef idx="0">
-            <a:schemeClr val="accent1"/>
-          </a:effectRef>
-          <a:fontRef idx="minor">
-            <a:schemeClr val="tx1"/>
-          </a:fontRef>
-        </p:style>
-      </p:cxnSp>
-      <p:cxnSp>
-        <p:nvCxnSpPr>
-          <p:cNvPr id="62" name="Straight Connector 61">
-            <a:extLst>
-              <a:ext uri="{FF2B5EF4-FFF2-40B4-BE49-F238E27FC236}">
-                <a16:creationId xmlns:a16="http://schemas.microsoft.com/office/drawing/2014/main" id="{D7662BF7-AA9D-8F3D-00D7-7F1A85222EA7}"/>
-              </a:ext>
-            </a:extLst>
-          </p:cNvPr>
-          <p:cNvCxnSpPr>
-            <a:cxnSpLocks/>
-          </p:cNvCxnSpPr>
-          <p:nvPr/>
-        </p:nvCxnSpPr>
-        <p:spPr>
-          <a:xfrm flipH="1" flipV="1">
-            <a:off x="7108621" y="3832123"/>
+            <a:off x="6984429" y="3339787"/>
             <a:ext cx="1939464" cy="226296"/>
           </a:xfrm>
           <a:prstGeom prst="line">
@@ -8456,7 +8326,7 @@
         <p:spPr>
           <a:xfrm>
             <a:off x="6067945" y="2818303"/>
-            <a:ext cx="765415" cy="825177"/>
+            <a:ext cx="656203" cy="729683"/>
           </a:xfrm>
           <a:prstGeom prst="straightConnector1">
             <a:avLst/>
@@ -9030,8 +8900,8 @@
         </p:nvCxnSpPr>
         <p:spPr>
           <a:xfrm flipH="1">
-            <a:off x="5912075" y="2809491"/>
-            <a:ext cx="1898933" cy="693921"/>
+            <a:off x="6124935" y="2809491"/>
+            <a:ext cx="1686073" cy="620012"/>
           </a:xfrm>
           <a:prstGeom prst="straightConnector1">
             <a:avLst/>
@@ -9071,8 +8941,8 @@
         </p:nvCxnSpPr>
         <p:spPr>
           <a:xfrm flipH="1">
-            <a:off x="7884731" y="2814263"/>
-            <a:ext cx="304460" cy="758994"/>
+            <a:off x="7784490" y="2814263"/>
+            <a:ext cx="404701" cy="628017"/>
           </a:xfrm>
           <a:prstGeom prst="straightConnector1">
             <a:avLst/>
@@ -9096,129 +8966,6 @@
           </a:fontRef>
         </p:style>
       </p:cxnSp>
-      <p:cxnSp>
-        <p:nvCxnSpPr>
-          <p:cNvPr id="72" name="Straight Arrow Connector 71">
-            <a:extLst>
-              <a:ext uri="{FF2B5EF4-FFF2-40B4-BE49-F238E27FC236}">
-                <a16:creationId xmlns:a16="http://schemas.microsoft.com/office/drawing/2014/main" id="{B378E88A-F926-AEE1-2A4F-99CA0AC7F99F}"/>
-              </a:ext>
-            </a:extLst>
-          </p:cNvPr>
-          <p:cNvCxnSpPr>
-            <a:cxnSpLocks/>
-          </p:cNvCxnSpPr>
-          <p:nvPr/>
-        </p:nvCxnSpPr>
-        <p:spPr>
-          <a:xfrm>
-            <a:off x="6012896" y="2826448"/>
-            <a:ext cx="812229" cy="1005483"/>
-          </a:xfrm>
-          <a:prstGeom prst="straightConnector1">
-            <a:avLst/>
-          </a:prstGeom>
-          <a:ln w="31750">
-            <a:tailEnd type="triangle"/>
-          </a:ln>
-        </p:spPr>
-        <p:style>
-          <a:lnRef idx="1">
-            <a:schemeClr val="dk1"/>
-          </a:lnRef>
-          <a:fillRef idx="0">
-            <a:schemeClr val="dk1"/>
-          </a:fillRef>
-          <a:effectRef idx="0">
-            <a:schemeClr val="dk1"/>
-          </a:effectRef>
-          <a:fontRef idx="minor">
-            <a:schemeClr val="tx1"/>
-          </a:fontRef>
-        </p:style>
-      </p:cxnSp>
-      <p:cxnSp>
-        <p:nvCxnSpPr>
-          <p:cNvPr id="78" name="Straight Arrow Connector 77">
-            <a:extLst>
-              <a:ext uri="{FF2B5EF4-FFF2-40B4-BE49-F238E27FC236}">
-                <a16:creationId xmlns:a16="http://schemas.microsoft.com/office/drawing/2014/main" id="{30340AA8-0A4E-3F38-1F5A-28708C92A011}"/>
-              </a:ext>
-            </a:extLst>
-          </p:cNvPr>
-          <p:cNvCxnSpPr>
-            <a:cxnSpLocks/>
-          </p:cNvCxnSpPr>
-          <p:nvPr/>
-        </p:nvCxnSpPr>
-        <p:spPr>
-          <a:xfrm flipH="1">
-            <a:off x="5756947" y="2828448"/>
-            <a:ext cx="2089592" cy="1090285"/>
-          </a:xfrm>
-          <a:prstGeom prst="straightConnector1">
-            <a:avLst/>
-          </a:prstGeom>
-          <a:ln w="31750">
-            <a:tailEnd type="triangle"/>
-          </a:ln>
-        </p:spPr>
-        <p:style>
-          <a:lnRef idx="1">
-            <a:schemeClr val="dk1"/>
-          </a:lnRef>
-          <a:fillRef idx="0">
-            <a:schemeClr val="dk1"/>
-          </a:fillRef>
-          <a:effectRef idx="0">
-            <a:schemeClr val="dk1"/>
-          </a:effectRef>
-          <a:fontRef idx="minor">
-            <a:schemeClr val="tx1"/>
-          </a:fontRef>
-        </p:style>
-      </p:cxnSp>
-      <p:cxnSp>
-        <p:nvCxnSpPr>
-          <p:cNvPr id="81" name="Straight Arrow Connector 80">
-            <a:extLst>
-              <a:ext uri="{FF2B5EF4-FFF2-40B4-BE49-F238E27FC236}">
-                <a16:creationId xmlns:a16="http://schemas.microsoft.com/office/drawing/2014/main" id="{8E631242-11E8-03C1-F1F2-071EE26823B6}"/>
-              </a:ext>
-            </a:extLst>
-          </p:cNvPr>
-          <p:cNvCxnSpPr>
-            <a:cxnSpLocks/>
-          </p:cNvCxnSpPr>
-          <p:nvPr/>
-        </p:nvCxnSpPr>
-        <p:spPr>
-          <a:xfrm flipH="1">
-            <a:off x="7920262" y="2826448"/>
-            <a:ext cx="285982" cy="1092285"/>
-          </a:xfrm>
-          <a:prstGeom prst="straightConnector1">
-            <a:avLst/>
-          </a:prstGeom>
-          <a:ln w="31750">
-            <a:tailEnd type="triangle"/>
-          </a:ln>
-        </p:spPr>
-        <p:style>
-          <a:lnRef idx="1">
-            <a:schemeClr val="dk1"/>
-          </a:lnRef>
-          <a:fillRef idx="0">
-            <a:schemeClr val="dk1"/>
-          </a:fillRef>
-          <a:effectRef idx="0">
-            <a:schemeClr val="dk1"/>
-          </a:effectRef>
-          <a:fontRef idx="minor">
-            <a:schemeClr val="tx1"/>
-          </a:fontRef>
-        </p:style>
-      </p:cxnSp>
       <p:sp>
         <p:nvSpPr>
           <p:cNvPr id="87" name="Rectangle: Rounded Corners 86">
@@ -9233,8 +8980,8 @@
         </p:nvSpPr>
         <p:spPr>
           <a:xfrm>
-            <a:off x="1082053" y="5255903"/>
-            <a:ext cx="2589940" cy="1032313"/>
+            <a:off x="1317982" y="5119423"/>
+            <a:ext cx="2058070" cy="1032313"/>
           </a:xfrm>
           <a:prstGeom prst="roundRect">
             <a:avLst/>
@@ -9288,8 +9035,8 @@
         </p:nvSpPr>
         <p:spPr>
           <a:xfrm>
-            <a:off x="1173511" y="5255903"/>
-            <a:ext cx="2407024" cy="943213"/>
+            <a:off x="1411660" y="5119423"/>
+            <a:ext cx="1872934" cy="943213"/>
           </a:xfrm>
           <a:prstGeom prst="roundRect">
             <a:avLst/>
@@ -9343,7 +9090,7 @@
         </p:nvSpPr>
         <p:spPr>
           <a:xfrm>
-            <a:off x="1002979" y="5307913"/>
+            <a:off x="1236710" y="5167314"/>
             <a:ext cx="161071" cy="164757"/>
           </a:xfrm>
           <a:prstGeom prst="ellipse">
@@ -9398,7 +9145,7 @@
         </p:nvSpPr>
         <p:spPr>
           <a:xfrm>
-            <a:off x="3580535" y="5303794"/>
+            <a:off x="3284595" y="5167314"/>
             <a:ext cx="161071" cy="164757"/>
           </a:xfrm>
           <a:prstGeom prst="ellipse">
@@ -9453,8 +9200,8 @@
         </p:nvSpPr>
         <p:spPr>
           <a:xfrm>
-            <a:off x="969787" y="5221416"/>
-            <a:ext cx="2836094" cy="164757"/>
+            <a:off x="1144597" y="5084936"/>
+            <a:ext cx="2365343" cy="164757"/>
           </a:xfrm>
           <a:prstGeom prst="rect">
             <a:avLst/>
@@ -9505,7 +9252,7 @@
         </p:nvSpPr>
         <p:spPr>
           <a:xfrm>
-            <a:off x="2011933" y="6199117"/>
+            <a:off x="2000265" y="6058840"/>
             <a:ext cx="672353" cy="117114"/>
           </a:xfrm>
           <a:prstGeom prst="rect">
@@ -9557,7 +9304,7 @@
         </p:nvSpPr>
         <p:spPr>
           <a:xfrm>
-            <a:off x="1876161" y="6148173"/>
+            <a:off x="1864493" y="6007896"/>
             <a:ext cx="943896" cy="50943"/>
           </a:xfrm>
           <a:prstGeom prst="rect">
@@ -9619,7 +9366,7 @@
         </p:nvCxnSpPr>
         <p:spPr>
           <a:xfrm>
-            <a:off x="2639588" y="6315156"/>
+            <a:off x="2627920" y="6174879"/>
             <a:ext cx="312762" cy="0"/>
           </a:xfrm>
           <a:prstGeom prst="line">
@@ -9665,7 +9412,7 @@
         </p:nvCxnSpPr>
         <p:spPr>
           <a:xfrm>
-            <a:off x="1710017" y="6314683"/>
+            <a:off x="1698349" y="6174406"/>
             <a:ext cx="343055" cy="0"/>
           </a:xfrm>
           <a:prstGeom prst="line">
@@ -9711,7 +9458,7 @@
         </p:nvCxnSpPr>
         <p:spPr>
           <a:xfrm flipV="1">
-            <a:off x="2053072" y="6122329"/>
+            <a:off x="2041404" y="5982052"/>
             <a:ext cx="0" cy="187934"/>
           </a:xfrm>
           <a:prstGeom prst="line">
@@ -9757,7 +9504,7 @@
         </p:nvCxnSpPr>
         <p:spPr>
           <a:xfrm flipV="1">
-            <a:off x="2639588" y="6122329"/>
+            <a:off x="2627920" y="5982052"/>
             <a:ext cx="0" cy="187934"/>
           </a:xfrm>
           <a:prstGeom prst="line">
@@ -9803,7 +9550,7 @@
         </p:nvCxnSpPr>
         <p:spPr>
           <a:xfrm>
-            <a:off x="2053072" y="6116361"/>
+            <a:off x="2041404" y="5976084"/>
             <a:ext cx="586516" cy="3797"/>
           </a:xfrm>
           <a:prstGeom prst="line">
@@ -9847,7 +9594,7 @@
         </p:nvSpPr>
         <p:spPr>
           <a:xfrm>
-            <a:off x="5493692" y="5255903"/>
+            <a:off x="5493692" y="5119423"/>
             <a:ext cx="2589940" cy="1032313"/>
           </a:xfrm>
           <a:prstGeom prst="roundRect">
@@ -9902,7 +9649,7 @@
         </p:nvSpPr>
         <p:spPr>
           <a:xfrm>
-            <a:off x="5585150" y="5255903"/>
+            <a:off x="5585150" y="5119423"/>
             <a:ext cx="2407024" cy="943213"/>
           </a:xfrm>
           <a:prstGeom prst="roundRect">
@@ -9957,7 +9704,7 @@
         </p:nvSpPr>
         <p:spPr>
           <a:xfrm>
-            <a:off x="5414618" y="5307913"/>
+            <a:off x="5414618" y="5171433"/>
             <a:ext cx="161071" cy="164757"/>
           </a:xfrm>
           <a:prstGeom prst="ellipse">
@@ -10012,7 +9759,7 @@
         </p:nvSpPr>
         <p:spPr>
           <a:xfrm>
-            <a:off x="7992174" y="5303794"/>
+            <a:off x="7992174" y="5167314"/>
             <a:ext cx="161071" cy="164757"/>
           </a:xfrm>
           <a:prstGeom prst="ellipse">
@@ -10067,7 +9814,7 @@
         </p:nvSpPr>
         <p:spPr>
           <a:xfrm>
-            <a:off x="5381426" y="5221416"/>
+            <a:off x="5381426" y="5084936"/>
             <a:ext cx="2836094" cy="164757"/>
           </a:xfrm>
           <a:prstGeom prst="rect">
@@ -10119,7 +9866,7 @@
         </p:nvSpPr>
         <p:spPr>
           <a:xfrm>
-            <a:off x="6423572" y="6199117"/>
+            <a:off x="6423572" y="6062637"/>
             <a:ext cx="672353" cy="117114"/>
           </a:xfrm>
           <a:prstGeom prst="rect">
@@ -10171,7 +9918,7 @@
         </p:nvSpPr>
         <p:spPr>
           <a:xfrm>
-            <a:off x="6287800" y="6148173"/>
+            <a:off x="6287800" y="6011693"/>
             <a:ext cx="943896" cy="50943"/>
           </a:xfrm>
           <a:prstGeom prst="rect">
@@ -10219,236 +9966,6 @@
       </p:sp>
       <p:cxnSp>
         <p:nvCxnSpPr>
-          <p:cNvPr id="123" name="Straight Connector 122">
-            <a:extLst>
-              <a:ext uri="{FF2B5EF4-FFF2-40B4-BE49-F238E27FC236}">
-                <a16:creationId xmlns:a16="http://schemas.microsoft.com/office/drawing/2014/main" id="{DE4BAB1D-01BF-4024-7F13-2F877A912D25}"/>
-              </a:ext>
-            </a:extLst>
-          </p:cNvPr>
-          <p:cNvCxnSpPr>
-            <a:cxnSpLocks/>
-          </p:cNvCxnSpPr>
-          <p:nvPr/>
-        </p:nvCxnSpPr>
-        <p:spPr>
-          <a:xfrm>
-            <a:off x="7051227" y="6315156"/>
-            <a:ext cx="312762" cy="0"/>
-          </a:xfrm>
-          <a:prstGeom prst="line">
-            <a:avLst/>
-          </a:prstGeom>
-          <a:ln w="50800">
-            <a:solidFill>
-              <a:schemeClr val="accent3">
-                <a:lumMod val="75000"/>
-              </a:schemeClr>
-            </a:solidFill>
-          </a:ln>
-          <a:effectLst/>
-        </p:spPr>
-        <p:style>
-          <a:lnRef idx="3">
-            <a:schemeClr val="accent3"/>
-          </a:lnRef>
-          <a:fillRef idx="0">
-            <a:schemeClr val="accent3"/>
-          </a:fillRef>
-          <a:effectRef idx="2">
-            <a:schemeClr val="accent3"/>
-          </a:effectRef>
-          <a:fontRef idx="minor">
-            <a:schemeClr val="tx1"/>
-          </a:fontRef>
-        </p:style>
-      </p:cxnSp>
-      <p:cxnSp>
-        <p:nvCxnSpPr>
-          <p:cNvPr id="124" name="Straight Connector 123">
-            <a:extLst>
-              <a:ext uri="{FF2B5EF4-FFF2-40B4-BE49-F238E27FC236}">
-                <a16:creationId xmlns:a16="http://schemas.microsoft.com/office/drawing/2014/main" id="{4AF9F2BE-75FE-CD4B-32D9-260A6A580ADF}"/>
-              </a:ext>
-            </a:extLst>
-          </p:cNvPr>
-          <p:cNvCxnSpPr>
-            <a:cxnSpLocks/>
-          </p:cNvCxnSpPr>
-          <p:nvPr/>
-        </p:nvCxnSpPr>
-        <p:spPr>
-          <a:xfrm>
-            <a:off x="6121656" y="6314683"/>
-            <a:ext cx="343055" cy="0"/>
-          </a:xfrm>
-          <a:prstGeom prst="line">
-            <a:avLst/>
-          </a:prstGeom>
-          <a:ln w="50800">
-            <a:solidFill>
-              <a:schemeClr val="accent3">
-                <a:lumMod val="75000"/>
-              </a:schemeClr>
-            </a:solidFill>
-          </a:ln>
-          <a:effectLst/>
-        </p:spPr>
-        <p:style>
-          <a:lnRef idx="3">
-            <a:schemeClr val="accent3"/>
-          </a:lnRef>
-          <a:fillRef idx="0">
-            <a:schemeClr val="accent3"/>
-          </a:fillRef>
-          <a:effectRef idx="2">
-            <a:schemeClr val="accent3"/>
-          </a:effectRef>
-          <a:fontRef idx="minor">
-            <a:schemeClr val="tx1"/>
-          </a:fontRef>
-        </p:style>
-      </p:cxnSp>
-      <p:cxnSp>
-        <p:nvCxnSpPr>
-          <p:cNvPr id="125" name="Straight Connector 124">
-            <a:extLst>
-              <a:ext uri="{FF2B5EF4-FFF2-40B4-BE49-F238E27FC236}">
-                <a16:creationId xmlns:a16="http://schemas.microsoft.com/office/drawing/2014/main" id="{4F196451-24F1-7F90-2DBB-3788A693A0E0}"/>
-              </a:ext>
-            </a:extLst>
-          </p:cNvPr>
-          <p:cNvCxnSpPr>
-            <a:cxnSpLocks/>
-          </p:cNvCxnSpPr>
-          <p:nvPr/>
-        </p:nvCxnSpPr>
-        <p:spPr>
-          <a:xfrm flipV="1">
-            <a:off x="6464711" y="6122329"/>
-            <a:ext cx="0" cy="187934"/>
-          </a:xfrm>
-          <a:prstGeom prst="line">
-            <a:avLst/>
-          </a:prstGeom>
-          <a:ln w="50800">
-            <a:solidFill>
-              <a:schemeClr val="accent3">
-                <a:lumMod val="75000"/>
-              </a:schemeClr>
-            </a:solidFill>
-          </a:ln>
-          <a:effectLst/>
-        </p:spPr>
-        <p:style>
-          <a:lnRef idx="3">
-            <a:schemeClr val="accent3"/>
-          </a:lnRef>
-          <a:fillRef idx="0">
-            <a:schemeClr val="accent3"/>
-          </a:fillRef>
-          <a:effectRef idx="2">
-            <a:schemeClr val="accent3"/>
-          </a:effectRef>
-          <a:fontRef idx="minor">
-            <a:schemeClr val="tx1"/>
-          </a:fontRef>
-        </p:style>
-      </p:cxnSp>
-      <p:cxnSp>
-        <p:nvCxnSpPr>
-          <p:cNvPr id="126" name="Straight Connector 125">
-            <a:extLst>
-              <a:ext uri="{FF2B5EF4-FFF2-40B4-BE49-F238E27FC236}">
-                <a16:creationId xmlns:a16="http://schemas.microsoft.com/office/drawing/2014/main" id="{0F66B825-A6A4-59F6-0A2B-C29D2835A49A}"/>
-              </a:ext>
-            </a:extLst>
-          </p:cNvPr>
-          <p:cNvCxnSpPr>
-            <a:cxnSpLocks/>
-          </p:cNvCxnSpPr>
-          <p:nvPr/>
-        </p:nvCxnSpPr>
-        <p:spPr>
-          <a:xfrm flipV="1">
-            <a:off x="7051227" y="6122329"/>
-            <a:ext cx="0" cy="187934"/>
-          </a:xfrm>
-          <a:prstGeom prst="line">
-            <a:avLst/>
-          </a:prstGeom>
-          <a:ln w="50800">
-            <a:solidFill>
-              <a:schemeClr val="accent3">
-                <a:lumMod val="75000"/>
-              </a:schemeClr>
-            </a:solidFill>
-          </a:ln>
-          <a:effectLst/>
-        </p:spPr>
-        <p:style>
-          <a:lnRef idx="3">
-            <a:schemeClr val="accent3"/>
-          </a:lnRef>
-          <a:fillRef idx="0">
-            <a:schemeClr val="accent3"/>
-          </a:fillRef>
-          <a:effectRef idx="2">
-            <a:schemeClr val="accent3"/>
-          </a:effectRef>
-          <a:fontRef idx="minor">
-            <a:schemeClr val="tx1"/>
-          </a:fontRef>
-        </p:style>
-      </p:cxnSp>
-      <p:cxnSp>
-        <p:nvCxnSpPr>
-          <p:cNvPr id="127" name="Straight Connector 126">
-            <a:extLst>
-              <a:ext uri="{FF2B5EF4-FFF2-40B4-BE49-F238E27FC236}">
-                <a16:creationId xmlns:a16="http://schemas.microsoft.com/office/drawing/2014/main" id="{A79AF807-D340-5D91-5296-5ED14AE78C04}"/>
-              </a:ext>
-            </a:extLst>
-          </p:cNvPr>
-          <p:cNvCxnSpPr>
-            <a:cxnSpLocks/>
-          </p:cNvCxnSpPr>
-          <p:nvPr/>
-        </p:nvCxnSpPr>
-        <p:spPr>
-          <a:xfrm>
-            <a:off x="6464711" y="6116361"/>
-            <a:ext cx="586516" cy="3797"/>
-          </a:xfrm>
-          <a:prstGeom prst="line">
-            <a:avLst/>
-          </a:prstGeom>
-          <a:ln w="50800">
-            <a:solidFill>
-              <a:schemeClr val="accent3">
-                <a:lumMod val="75000"/>
-              </a:schemeClr>
-            </a:solidFill>
-          </a:ln>
-          <a:effectLst/>
-        </p:spPr>
-        <p:style>
-          <a:lnRef idx="3">
-            <a:schemeClr val="accent3"/>
-          </a:lnRef>
-          <a:fillRef idx="0">
-            <a:schemeClr val="accent3"/>
-          </a:fillRef>
-          <a:effectRef idx="2">
-            <a:schemeClr val="accent3"/>
-          </a:effectRef>
-          <a:fontRef idx="minor">
-            <a:schemeClr val="tx1"/>
-          </a:fontRef>
-        </p:style>
-      </p:cxnSp>
-      <p:cxnSp>
-        <p:nvCxnSpPr>
           <p:cNvPr id="128" name="Straight Connector 127">
             <a:extLst>
               <a:ext uri="{FF2B5EF4-FFF2-40B4-BE49-F238E27FC236}">
@@ -10463,8 +9980,8 @@
         </p:nvCxnSpPr>
         <p:spPr>
           <a:xfrm flipH="1">
-            <a:off x="6534452" y="6218210"/>
-            <a:ext cx="434349" cy="0"/>
+            <a:off x="6663113" y="6080183"/>
+            <a:ext cx="251139" cy="0"/>
           </a:xfrm>
           <a:prstGeom prst="line">
             <a:avLst/>
@@ -10506,7 +10023,7 @@
         </p:nvCxnSpPr>
         <p:spPr>
           <a:xfrm flipH="1">
-            <a:off x="6981253" y="6125051"/>
+            <a:off x="6901984" y="5995530"/>
             <a:ext cx="129584" cy="85088"/>
           </a:xfrm>
           <a:prstGeom prst="line">
@@ -10549,8 +10066,8 @@
         </p:nvCxnSpPr>
         <p:spPr>
           <a:xfrm flipH="1">
-            <a:off x="7115748" y="6125051"/>
-            <a:ext cx="730791" cy="5784"/>
+            <a:off x="7027532" y="5988571"/>
+            <a:ext cx="819007" cy="6524"/>
           </a:xfrm>
           <a:prstGeom prst="line">
             <a:avLst/>
@@ -10592,8 +10109,8 @@
         </p:nvCxnSpPr>
         <p:spPr>
           <a:xfrm flipH="1">
-            <a:off x="5706409" y="6131575"/>
-            <a:ext cx="707932" cy="0"/>
+            <a:off x="5706409" y="5995095"/>
+            <a:ext cx="830682" cy="0"/>
           </a:xfrm>
           <a:prstGeom prst="line">
             <a:avLst/>
@@ -10635,7 +10152,7 @@
         </p:nvCxnSpPr>
         <p:spPr>
           <a:xfrm>
-            <a:off x="6414341" y="6131575"/>
+            <a:off x="6537092" y="5989830"/>
             <a:ext cx="129584" cy="85088"/>
           </a:xfrm>
           <a:prstGeom prst="line">
@@ -10678,7 +10195,7 @@
         </p:nvCxnSpPr>
         <p:spPr>
           <a:xfrm flipH="1">
-            <a:off x="7865764" y="6040067"/>
+            <a:off x="7865764" y="5903587"/>
             <a:ext cx="75732" cy="84984"/>
           </a:xfrm>
           <a:prstGeom prst="line">
@@ -10721,7 +10238,7 @@
         </p:nvCxnSpPr>
         <p:spPr>
           <a:xfrm>
-            <a:off x="5630677" y="6044636"/>
+            <a:off x="5630677" y="5908156"/>
             <a:ext cx="75732" cy="84984"/>
           </a:xfrm>
           <a:prstGeom prst="line">
@@ -10764,7 +10281,7 @@
         </p:nvCxnSpPr>
         <p:spPr>
           <a:xfrm>
-            <a:off x="7941496" y="5339301"/>
+            <a:off x="7941496" y="5202821"/>
             <a:ext cx="0" cy="696125"/>
           </a:xfrm>
           <a:prstGeom prst="line">
@@ -10807,7 +10324,7 @@
         </p:nvCxnSpPr>
         <p:spPr>
           <a:xfrm>
-            <a:off x="5630677" y="5348511"/>
+            <a:off x="5630677" y="5212031"/>
             <a:ext cx="0" cy="696125"/>
           </a:xfrm>
           <a:prstGeom prst="line">
@@ -10850,7 +10367,7 @@
         </p:nvCxnSpPr>
         <p:spPr>
           <a:xfrm flipH="1">
-            <a:off x="7949256" y="5339301"/>
+            <a:off x="7949256" y="5202821"/>
             <a:ext cx="217868" cy="0"/>
           </a:xfrm>
           <a:prstGeom prst="line">
@@ -10893,7 +10410,7 @@
         </p:nvCxnSpPr>
         <p:spPr>
           <a:xfrm flipH="1">
-            <a:off x="5411979" y="5348511"/>
+            <a:off x="5411979" y="5212031"/>
             <a:ext cx="217868" cy="0"/>
           </a:xfrm>
           <a:prstGeom prst="line">
@@ -10936,7 +10453,7 @@
         </p:nvCxnSpPr>
         <p:spPr>
           <a:xfrm flipH="1">
-            <a:off x="4985468" y="5348511"/>
+            <a:off x="4985468" y="5212031"/>
             <a:ext cx="426511" cy="523527"/>
           </a:xfrm>
           <a:prstGeom prst="line">
@@ -10979,7 +10496,7 @@
         </p:nvCxnSpPr>
         <p:spPr>
           <a:xfrm>
-            <a:off x="8161480" y="5340772"/>
+            <a:off x="8161480" y="5204292"/>
             <a:ext cx="426511" cy="523527"/>
           </a:xfrm>
           <a:prstGeom prst="line">
@@ -11022,7 +10539,7 @@
         </p:nvCxnSpPr>
         <p:spPr>
           <a:xfrm flipH="1">
-            <a:off x="8589622" y="5602535"/>
+            <a:off x="8589622" y="5466055"/>
             <a:ext cx="259425" cy="261764"/>
           </a:xfrm>
           <a:prstGeom prst="line">
@@ -11304,7 +10821,7 @@
             </a:lvl9pPr>
           </a:lstStyle>
           <a:p>
-            <a:pPr marL="0" indent="0">
+            <a:pPr marL="0" indent="0" algn="ctr">
               <a:buFont typeface="Wingdings 3" charset="2"/>
               <a:buNone/>
             </a:pPr>
@@ -11414,7 +10931,7 @@
         </p:nvSpPr>
         <p:spPr>
           <a:xfrm>
-            <a:off x="9100310" y="5696573"/>
+            <a:off x="9100310" y="5560093"/>
             <a:ext cx="1773708" cy="1288379"/>
           </a:xfrm>
           <a:prstGeom prst="rect">
@@ -11653,7 +11170,7 @@
             </a:lvl9pPr>
           </a:lstStyle>
           <a:p>
-            <a:pPr marL="0" indent="0">
+            <a:pPr marL="0" indent="0" algn="ctr">
               <a:buFont typeface="Wingdings 3" charset="2"/>
               <a:buNone/>
             </a:pPr>
@@ -11681,7 +11198,7 @@
         </p:nvCxnSpPr>
         <p:spPr>
           <a:xfrm flipH="1" flipV="1">
-            <a:off x="8658157" y="5962406"/>
+            <a:off x="8658157" y="5825926"/>
             <a:ext cx="442153" cy="120153"/>
           </a:xfrm>
           <a:prstGeom prst="straightConnector1">
@@ -11706,6 +11223,1133 @@
           </a:fontRef>
         </p:style>
       </p:cxnSp>
+      <p:sp>
+        <p:nvSpPr>
+          <p:cNvPr id="29" name="Oval 28">
+            <a:extLst>
+              <a:ext uri="{FF2B5EF4-FFF2-40B4-BE49-F238E27FC236}">
+                <a16:creationId xmlns:a16="http://schemas.microsoft.com/office/drawing/2014/main" id="{F9C9075F-BB5E-6A25-9B77-A873AAB5E7AF}"/>
+              </a:ext>
+            </a:extLst>
+          </p:cNvPr>
+          <p:cNvSpPr/>
+          <p:nvPr/>
+        </p:nvSpPr>
+        <p:spPr>
+          <a:xfrm>
+            <a:off x="6740406" y="5933846"/>
+            <a:ext cx="99663" cy="99663"/>
+          </a:xfrm>
+          <a:prstGeom prst="ellipse">
+            <a:avLst/>
+          </a:prstGeom>
+          <a:solidFill>
+            <a:schemeClr val="accent3">
+              <a:lumMod val="75000"/>
+            </a:schemeClr>
+          </a:solidFill>
+          <a:ln>
+            <a:noFill/>
+          </a:ln>
+        </p:spPr>
+        <p:style>
+          <a:lnRef idx="2">
+            <a:schemeClr val="accent1">
+              <a:shade val="15000"/>
+            </a:schemeClr>
+          </a:lnRef>
+          <a:fillRef idx="1">
+            <a:schemeClr val="accent1"/>
+          </a:fillRef>
+          <a:effectRef idx="0">
+            <a:schemeClr val="accent1"/>
+          </a:effectRef>
+          <a:fontRef idx="minor">
+            <a:schemeClr val="lt1"/>
+          </a:fontRef>
+        </p:style>
+        <p:txBody>
+          <a:bodyPr rtlCol="0" anchor="ctr"/>
+          <a:lstStyle/>
+          <a:p>
+            <a:pPr algn="ctr"/>
+            <a:endParaRPr lang="en-GB"/>
+          </a:p>
+        </p:txBody>
+      </p:sp>
+      <p:sp>
+        <p:nvSpPr>
+          <p:cNvPr id="33" name="Oval 32">
+            <a:extLst>
+              <a:ext uri="{FF2B5EF4-FFF2-40B4-BE49-F238E27FC236}">
+                <a16:creationId xmlns:a16="http://schemas.microsoft.com/office/drawing/2014/main" id="{38EC7BCC-11ED-BC5A-E33E-088952E9D484}"/>
+              </a:ext>
+            </a:extLst>
+          </p:cNvPr>
+          <p:cNvSpPr/>
+          <p:nvPr/>
+        </p:nvSpPr>
+        <p:spPr>
+          <a:xfrm>
+            <a:off x="6738852" y="6119698"/>
+            <a:ext cx="99663" cy="99663"/>
+          </a:xfrm>
+          <a:prstGeom prst="ellipse">
+            <a:avLst/>
+          </a:prstGeom>
+          <a:solidFill>
+            <a:schemeClr val="accent3">
+              <a:lumMod val="75000"/>
+            </a:schemeClr>
+          </a:solidFill>
+          <a:ln>
+            <a:noFill/>
+          </a:ln>
+        </p:spPr>
+        <p:style>
+          <a:lnRef idx="2">
+            <a:schemeClr val="accent1">
+              <a:shade val="15000"/>
+            </a:schemeClr>
+          </a:lnRef>
+          <a:fillRef idx="1">
+            <a:schemeClr val="accent1"/>
+          </a:fillRef>
+          <a:effectRef idx="0">
+            <a:schemeClr val="accent1"/>
+          </a:effectRef>
+          <a:fontRef idx="minor">
+            <a:schemeClr val="lt1"/>
+          </a:fontRef>
+        </p:style>
+        <p:txBody>
+          <a:bodyPr rtlCol="0" anchor="ctr"/>
+          <a:lstStyle/>
+          <a:p>
+            <a:pPr algn="ctr"/>
+            <a:endParaRPr lang="en-GB"/>
+          </a:p>
+        </p:txBody>
+      </p:sp>
+      <p:cxnSp>
+        <p:nvCxnSpPr>
+          <p:cNvPr id="125" name="Straight Connector 124">
+            <a:extLst>
+              <a:ext uri="{FF2B5EF4-FFF2-40B4-BE49-F238E27FC236}">
+                <a16:creationId xmlns:a16="http://schemas.microsoft.com/office/drawing/2014/main" id="{4F196451-24F1-7F90-2DBB-3788A693A0E0}"/>
+              </a:ext>
+            </a:extLst>
+          </p:cNvPr>
+          <p:cNvCxnSpPr>
+            <a:cxnSpLocks/>
+          </p:cNvCxnSpPr>
+          <p:nvPr/>
+        </p:nvCxnSpPr>
+        <p:spPr>
+          <a:xfrm flipV="1">
+            <a:off x="6789754" y="5976084"/>
+            <a:ext cx="0" cy="187934"/>
+          </a:xfrm>
+          <a:prstGeom prst="line">
+            <a:avLst/>
+          </a:prstGeom>
+          <a:ln w="50800">
+            <a:solidFill>
+              <a:schemeClr val="accent3">
+                <a:lumMod val="75000"/>
+              </a:schemeClr>
+            </a:solidFill>
+          </a:ln>
+          <a:effectLst/>
+        </p:spPr>
+        <p:style>
+          <a:lnRef idx="3">
+            <a:schemeClr val="accent3"/>
+          </a:lnRef>
+          <a:fillRef idx="0">
+            <a:schemeClr val="accent3"/>
+          </a:fillRef>
+          <a:effectRef idx="2">
+            <a:schemeClr val="accent3"/>
+          </a:effectRef>
+          <a:fontRef idx="minor">
+            <a:schemeClr val="tx1"/>
+          </a:fontRef>
+        </p:style>
+      </p:cxnSp>
+      <p:sp>
+        <p:nvSpPr>
+          <p:cNvPr id="34" name="Content Placeholder 2">
+            <a:extLst>
+              <a:ext uri="{FF2B5EF4-FFF2-40B4-BE49-F238E27FC236}">
+                <a16:creationId xmlns:a16="http://schemas.microsoft.com/office/drawing/2014/main" id="{E785F280-6E38-9A94-756B-8CC2F5F3A30A}"/>
+              </a:ext>
+            </a:extLst>
+          </p:cNvPr>
+          <p:cNvSpPr txBox="1">
+            <a:spLocks/>
+          </p:cNvSpPr>
+          <p:nvPr/>
+        </p:nvSpPr>
+        <p:spPr>
+          <a:xfrm>
+            <a:off x="3906937" y="5862653"/>
+            <a:ext cx="1474998" cy="830150"/>
+          </a:xfrm>
+          <a:prstGeom prst="rect">
+            <a:avLst/>
+          </a:prstGeom>
+        </p:spPr>
+        <p:txBody>
+          <a:bodyPr vert="horz" lIns="91440" tIns="45720" rIns="91440" bIns="45720" rtlCol="0">
+            <a:normAutofit/>
+          </a:bodyPr>
+          <a:lstStyle>
+            <a:lvl1pPr marL="342900" indent="-342900" algn="l" defTabSz="457200" rtl="0" eaLnBrk="1" latinLnBrk="0" hangingPunct="1">
+              <a:spcBef>
+                <a:spcPts val="1000"/>
+              </a:spcBef>
+              <a:spcAft>
+                <a:spcPts val="0"/>
+              </a:spcAft>
+              <a:buClr>
+                <a:schemeClr val="accent1"/>
+              </a:buClr>
+              <a:buSzPct val="80000"/>
+              <a:buFont typeface="Wingdings 3" charset="2"/>
+              <a:buChar char=""/>
+              <a:defRPr sz="1800" kern="1200">
+                <a:solidFill>
+                  <a:schemeClr val="tx1">
+                    <a:lumMod val="75000"/>
+                    <a:lumOff val="25000"/>
+                  </a:schemeClr>
+                </a:solidFill>
+                <a:latin typeface="+mn-lt"/>
+                <a:ea typeface="+mn-ea"/>
+                <a:cs typeface="+mn-cs"/>
+              </a:defRPr>
+            </a:lvl1pPr>
+            <a:lvl2pPr marL="742950" indent="-285750" algn="l" defTabSz="457200" rtl="0" eaLnBrk="1" latinLnBrk="0" hangingPunct="1">
+              <a:spcBef>
+                <a:spcPts val="1000"/>
+              </a:spcBef>
+              <a:spcAft>
+                <a:spcPts val="0"/>
+              </a:spcAft>
+              <a:buClr>
+                <a:schemeClr val="accent1"/>
+              </a:buClr>
+              <a:buSzPct val="80000"/>
+              <a:buFont typeface="Wingdings 3" charset="2"/>
+              <a:buChar char=""/>
+              <a:defRPr sz="1600" kern="1200">
+                <a:solidFill>
+                  <a:schemeClr val="tx1">
+                    <a:lumMod val="75000"/>
+                    <a:lumOff val="25000"/>
+                  </a:schemeClr>
+                </a:solidFill>
+                <a:latin typeface="+mn-lt"/>
+                <a:ea typeface="+mn-ea"/>
+                <a:cs typeface="+mn-cs"/>
+              </a:defRPr>
+            </a:lvl2pPr>
+            <a:lvl3pPr marL="1143000" indent="-228600" algn="l" defTabSz="457200" rtl="0" eaLnBrk="1" latinLnBrk="0" hangingPunct="1">
+              <a:spcBef>
+                <a:spcPts val="1000"/>
+              </a:spcBef>
+              <a:spcAft>
+                <a:spcPts val="0"/>
+              </a:spcAft>
+              <a:buClr>
+                <a:schemeClr val="accent1"/>
+              </a:buClr>
+              <a:buSzPct val="80000"/>
+              <a:buFont typeface="Wingdings 3" charset="2"/>
+              <a:buChar char=""/>
+              <a:defRPr sz="1400" kern="1200">
+                <a:solidFill>
+                  <a:schemeClr val="tx1">
+                    <a:lumMod val="75000"/>
+                    <a:lumOff val="25000"/>
+                  </a:schemeClr>
+                </a:solidFill>
+                <a:latin typeface="+mn-lt"/>
+                <a:ea typeface="+mn-ea"/>
+                <a:cs typeface="+mn-cs"/>
+              </a:defRPr>
+            </a:lvl3pPr>
+            <a:lvl4pPr marL="1600200" indent="-228600" algn="l" defTabSz="457200" rtl="0" eaLnBrk="1" latinLnBrk="0" hangingPunct="1">
+              <a:spcBef>
+                <a:spcPts val="1000"/>
+              </a:spcBef>
+              <a:spcAft>
+                <a:spcPts val="0"/>
+              </a:spcAft>
+              <a:buClr>
+                <a:schemeClr val="accent1"/>
+              </a:buClr>
+              <a:buSzPct val="80000"/>
+              <a:buFont typeface="Wingdings 3" charset="2"/>
+              <a:buChar char=""/>
+              <a:defRPr sz="1200" kern="1200">
+                <a:solidFill>
+                  <a:schemeClr val="tx1">
+                    <a:lumMod val="75000"/>
+                    <a:lumOff val="25000"/>
+                  </a:schemeClr>
+                </a:solidFill>
+                <a:latin typeface="+mn-lt"/>
+                <a:ea typeface="+mn-ea"/>
+                <a:cs typeface="+mn-cs"/>
+              </a:defRPr>
+            </a:lvl4pPr>
+            <a:lvl5pPr marL="2057400" indent="-228600" algn="l" defTabSz="457200" rtl="0" eaLnBrk="1" latinLnBrk="0" hangingPunct="1">
+              <a:spcBef>
+                <a:spcPts val="1000"/>
+              </a:spcBef>
+              <a:spcAft>
+                <a:spcPts val="0"/>
+              </a:spcAft>
+              <a:buClr>
+                <a:schemeClr val="accent1"/>
+              </a:buClr>
+              <a:buSzPct val="80000"/>
+              <a:buFont typeface="Wingdings 3" charset="2"/>
+              <a:buChar char=""/>
+              <a:defRPr sz="1200" kern="1200">
+                <a:solidFill>
+                  <a:schemeClr val="tx1">
+                    <a:lumMod val="75000"/>
+                    <a:lumOff val="25000"/>
+                  </a:schemeClr>
+                </a:solidFill>
+                <a:latin typeface="+mn-lt"/>
+                <a:ea typeface="+mn-ea"/>
+                <a:cs typeface="+mn-cs"/>
+              </a:defRPr>
+            </a:lvl5pPr>
+            <a:lvl6pPr marL="2514600" indent="-228600" algn="l" defTabSz="457200" rtl="0" eaLnBrk="1" latinLnBrk="0" hangingPunct="1">
+              <a:spcBef>
+                <a:spcPts val="1000"/>
+              </a:spcBef>
+              <a:spcAft>
+                <a:spcPts val="0"/>
+              </a:spcAft>
+              <a:buClr>
+                <a:schemeClr val="accent1"/>
+              </a:buClr>
+              <a:buSzPct val="80000"/>
+              <a:buFont typeface="Wingdings 3" charset="2"/>
+              <a:buChar char=""/>
+              <a:defRPr sz="1200" kern="1200">
+                <a:solidFill>
+                  <a:schemeClr val="tx1">
+                    <a:lumMod val="75000"/>
+                    <a:lumOff val="25000"/>
+                  </a:schemeClr>
+                </a:solidFill>
+                <a:latin typeface="+mn-lt"/>
+                <a:ea typeface="+mn-ea"/>
+                <a:cs typeface="+mn-cs"/>
+              </a:defRPr>
+            </a:lvl6pPr>
+            <a:lvl7pPr marL="2971800" indent="-228600" algn="l" defTabSz="457200" rtl="0" eaLnBrk="1" latinLnBrk="0" hangingPunct="1">
+              <a:spcBef>
+                <a:spcPts val="1000"/>
+              </a:spcBef>
+              <a:spcAft>
+                <a:spcPts val="0"/>
+              </a:spcAft>
+              <a:buClr>
+                <a:schemeClr val="accent1"/>
+              </a:buClr>
+              <a:buSzPct val="80000"/>
+              <a:buFont typeface="Wingdings 3" charset="2"/>
+              <a:buChar char=""/>
+              <a:defRPr sz="1200" kern="1200">
+                <a:solidFill>
+                  <a:schemeClr val="tx1">
+                    <a:lumMod val="75000"/>
+                    <a:lumOff val="25000"/>
+                  </a:schemeClr>
+                </a:solidFill>
+                <a:latin typeface="+mn-lt"/>
+                <a:ea typeface="+mn-ea"/>
+                <a:cs typeface="+mn-cs"/>
+              </a:defRPr>
+            </a:lvl7pPr>
+            <a:lvl8pPr marL="3429000" indent="-228600" algn="l" defTabSz="457200" rtl="0" eaLnBrk="1" latinLnBrk="0" hangingPunct="1">
+              <a:spcBef>
+                <a:spcPts val="1000"/>
+              </a:spcBef>
+              <a:spcAft>
+                <a:spcPts val="0"/>
+              </a:spcAft>
+              <a:buClr>
+                <a:schemeClr val="accent1"/>
+              </a:buClr>
+              <a:buSzPct val="80000"/>
+              <a:buFont typeface="Wingdings 3" charset="2"/>
+              <a:buChar char=""/>
+              <a:defRPr sz="1200" kern="1200">
+                <a:solidFill>
+                  <a:schemeClr val="tx1">
+                    <a:lumMod val="75000"/>
+                    <a:lumOff val="25000"/>
+                  </a:schemeClr>
+                </a:solidFill>
+                <a:latin typeface="+mn-lt"/>
+                <a:ea typeface="+mn-ea"/>
+                <a:cs typeface="+mn-cs"/>
+              </a:defRPr>
+            </a:lvl8pPr>
+            <a:lvl9pPr marL="3886200" indent="-228600" algn="l" defTabSz="457200" rtl="0" eaLnBrk="1" latinLnBrk="0" hangingPunct="1">
+              <a:spcBef>
+                <a:spcPts val="1000"/>
+              </a:spcBef>
+              <a:spcAft>
+                <a:spcPts val="0"/>
+              </a:spcAft>
+              <a:buClr>
+                <a:schemeClr val="accent1"/>
+              </a:buClr>
+              <a:buSzPct val="80000"/>
+              <a:buFont typeface="Wingdings 3" charset="2"/>
+              <a:buChar char=""/>
+              <a:defRPr sz="1200" kern="1200">
+                <a:solidFill>
+                  <a:schemeClr val="tx1">
+                    <a:lumMod val="75000"/>
+                    <a:lumOff val="25000"/>
+                  </a:schemeClr>
+                </a:solidFill>
+                <a:latin typeface="+mn-lt"/>
+                <a:ea typeface="+mn-ea"/>
+                <a:cs typeface="+mn-cs"/>
+              </a:defRPr>
+            </a:lvl9pPr>
+          </a:lstStyle>
+          <a:p>
+            <a:pPr marL="0" indent="0" algn="ctr">
+              <a:buFont typeface="Wingdings 3" charset="2"/>
+              <a:buNone/>
+            </a:pPr>
+            <a:r>
+              <a:rPr lang="en-US" sz="1400" b="1" dirty="0"/>
+              <a:t>guy wire will be held in place by staple</a:t>
+            </a:r>
+            <a:endParaRPr lang="en-US" sz="1400" dirty="0"/>
+          </a:p>
+        </p:txBody>
+      </p:sp>
+      <p:cxnSp>
+        <p:nvCxnSpPr>
+          <p:cNvPr id="36" name="Straight Arrow Connector 35">
+            <a:extLst>
+              <a:ext uri="{FF2B5EF4-FFF2-40B4-BE49-F238E27FC236}">
+                <a16:creationId xmlns:a16="http://schemas.microsoft.com/office/drawing/2014/main" id="{6D2004BC-8847-040E-992B-C101CCC7E537}"/>
+              </a:ext>
+            </a:extLst>
+          </p:cNvPr>
+          <p:cNvCxnSpPr>
+            <a:cxnSpLocks/>
+          </p:cNvCxnSpPr>
+          <p:nvPr/>
+        </p:nvCxnSpPr>
+        <p:spPr>
+          <a:xfrm flipV="1">
+            <a:off x="5224666" y="6164018"/>
+            <a:ext cx="1367450" cy="163505"/>
+          </a:xfrm>
+          <a:prstGeom prst="straightConnector1">
+            <a:avLst/>
+          </a:prstGeom>
+          <a:ln w="31750">
+            <a:tailEnd type="triangle"/>
+          </a:ln>
+        </p:spPr>
+        <p:style>
+          <a:lnRef idx="1">
+            <a:schemeClr val="dk1"/>
+          </a:lnRef>
+          <a:fillRef idx="0">
+            <a:schemeClr val="dk1"/>
+          </a:fillRef>
+          <a:effectRef idx="0">
+            <a:schemeClr val="dk1"/>
+          </a:effectRef>
+          <a:fontRef idx="minor">
+            <a:schemeClr val="tx1"/>
+          </a:fontRef>
+        </p:style>
+      </p:cxnSp>
+      <p:sp>
+        <p:nvSpPr>
+          <p:cNvPr id="39" name="Content Placeholder 2">
+            <a:extLst>
+              <a:ext uri="{FF2B5EF4-FFF2-40B4-BE49-F238E27FC236}">
+                <a16:creationId xmlns:a16="http://schemas.microsoft.com/office/drawing/2014/main" id="{25F18B91-3D11-47B5-0623-426584496B09}"/>
+              </a:ext>
+            </a:extLst>
+          </p:cNvPr>
+          <p:cNvSpPr txBox="1">
+            <a:spLocks/>
+          </p:cNvSpPr>
+          <p:nvPr/>
+        </p:nvSpPr>
+        <p:spPr>
+          <a:xfrm>
+            <a:off x="1813318" y="5287247"/>
+            <a:ext cx="1054894" cy="830150"/>
+          </a:xfrm>
+          <a:prstGeom prst="rect">
+            <a:avLst/>
+          </a:prstGeom>
+        </p:spPr>
+        <p:txBody>
+          <a:bodyPr vert="horz" lIns="91440" tIns="45720" rIns="91440" bIns="45720" rtlCol="0">
+            <a:normAutofit/>
+          </a:bodyPr>
+          <a:lstStyle>
+            <a:lvl1pPr marL="342900" indent="-342900" algn="l" defTabSz="457200" rtl="0" eaLnBrk="1" latinLnBrk="0" hangingPunct="1">
+              <a:spcBef>
+                <a:spcPts val="1000"/>
+              </a:spcBef>
+              <a:spcAft>
+                <a:spcPts val="0"/>
+              </a:spcAft>
+              <a:buClr>
+                <a:schemeClr val="accent1"/>
+              </a:buClr>
+              <a:buSzPct val="80000"/>
+              <a:buFont typeface="Wingdings 3" charset="2"/>
+              <a:buChar char=""/>
+              <a:defRPr sz="1800" kern="1200">
+                <a:solidFill>
+                  <a:schemeClr val="tx1">
+                    <a:lumMod val="75000"/>
+                    <a:lumOff val="25000"/>
+                  </a:schemeClr>
+                </a:solidFill>
+                <a:latin typeface="+mn-lt"/>
+                <a:ea typeface="+mn-ea"/>
+                <a:cs typeface="+mn-cs"/>
+              </a:defRPr>
+            </a:lvl1pPr>
+            <a:lvl2pPr marL="742950" indent="-285750" algn="l" defTabSz="457200" rtl="0" eaLnBrk="1" latinLnBrk="0" hangingPunct="1">
+              <a:spcBef>
+                <a:spcPts val="1000"/>
+              </a:spcBef>
+              <a:spcAft>
+                <a:spcPts val="0"/>
+              </a:spcAft>
+              <a:buClr>
+                <a:schemeClr val="accent1"/>
+              </a:buClr>
+              <a:buSzPct val="80000"/>
+              <a:buFont typeface="Wingdings 3" charset="2"/>
+              <a:buChar char=""/>
+              <a:defRPr sz="1600" kern="1200">
+                <a:solidFill>
+                  <a:schemeClr val="tx1">
+                    <a:lumMod val="75000"/>
+                    <a:lumOff val="25000"/>
+                  </a:schemeClr>
+                </a:solidFill>
+                <a:latin typeface="+mn-lt"/>
+                <a:ea typeface="+mn-ea"/>
+                <a:cs typeface="+mn-cs"/>
+              </a:defRPr>
+            </a:lvl2pPr>
+            <a:lvl3pPr marL="1143000" indent="-228600" algn="l" defTabSz="457200" rtl="0" eaLnBrk="1" latinLnBrk="0" hangingPunct="1">
+              <a:spcBef>
+                <a:spcPts val="1000"/>
+              </a:spcBef>
+              <a:spcAft>
+                <a:spcPts val="0"/>
+              </a:spcAft>
+              <a:buClr>
+                <a:schemeClr val="accent1"/>
+              </a:buClr>
+              <a:buSzPct val="80000"/>
+              <a:buFont typeface="Wingdings 3" charset="2"/>
+              <a:buChar char=""/>
+              <a:defRPr sz="1400" kern="1200">
+                <a:solidFill>
+                  <a:schemeClr val="tx1">
+                    <a:lumMod val="75000"/>
+                    <a:lumOff val="25000"/>
+                  </a:schemeClr>
+                </a:solidFill>
+                <a:latin typeface="+mn-lt"/>
+                <a:ea typeface="+mn-ea"/>
+                <a:cs typeface="+mn-cs"/>
+              </a:defRPr>
+            </a:lvl3pPr>
+            <a:lvl4pPr marL="1600200" indent="-228600" algn="l" defTabSz="457200" rtl="0" eaLnBrk="1" latinLnBrk="0" hangingPunct="1">
+              <a:spcBef>
+                <a:spcPts val="1000"/>
+              </a:spcBef>
+              <a:spcAft>
+                <a:spcPts val="0"/>
+              </a:spcAft>
+              <a:buClr>
+                <a:schemeClr val="accent1"/>
+              </a:buClr>
+              <a:buSzPct val="80000"/>
+              <a:buFont typeface="Wingdings 3" charset="2"/>
+              <a:buChar char=""/>
+              <a:defRPr sz="1200" kern="1200">
+                <a:solidFill>
+                  <a:schemeClr val="tx1">
+                    <a:lumMod val="75000"/>
+                    <a:lumOff val="25000"/>
+                  </a:schemeClr>
+                </a:solidFill>
+                <a:latin typeface="+mn-lt"/>
+                <a:ea typeface="+mn-ea"/>
+                <a:cs typeface="+mn-cs"/>
+              </a:defRPr>
+            </a:lvl4pPr>
+            <a:lvl5pPr marL="2057400" indent="-228600" algn="l" defTabSz="457200" rtl="0" eaLnBrk="1" latinLnBrk="0" hangingPunct="1">
+              <a:spcBef>
+                <a:spcPts val="1000"/>
+              </a:spcBef>
+              <a:spcAft>
+                <a:spcPts val="0"/>
+              </a:spcAft>
+              <a:buClr>
+                <a:schemeClr val="accent1"/>
+              </a:buClr>
+              <a:buSzPct val="80000"/>
+              <a:buFont typeface="Wingdings 3" charset="2"/>
+              <a:buChar char=""/>
+              <a:defRPr sz="1200" kern="1200">
+                <a:solidFill>
+                  <a:schemeClr val="tx1">
+                    <a:lumMod val="75000"/>
+                    <a:lumOff val="25000"/>
+                  </a:schemeClr>
+                </a:solidFill>
+                <a:latin typeface="+mn-lt"/>
+                <a:ea typeface="+mn-ea"/>
+                <a:cs typeface="+mn-cs"/>
+              </a:defRPr>
+            </a:lvl5pPr>
+            <a:lvl6pPr marL="2514600" indent="-228600" algn="l" defTabSz="457200" rtl="0" eaLnBrk="1" latinLnBrk="0" hangingPunct="1">
+              <a:spcBef>
+                <a:spcPts val="1000"/>
+              </a:spcBef>
+              <a:spcAft>
+                <a:spcPts val="0"/>
+              </a:spcAft>
+              <a:buClr>
+                <a:schemeClr val="accent1"/>
+              </a:buClr>
+              <a:buSzPct val="80000"/>
+              <a:buFont typeface="Wingdings 3" charset="2"/>
+              <a:buChar char=""/>
+              <a:defRPr sz="1200" kern="1200">
+                <a:solidFill>
+                  <a:schemeClr val="tx1">
+                    <a:lumMod val="75000"/>
+                    <a:lumOff val="25000"/>
+                  </a:schemeClr>
+                </a:solidFill>
+                <a:latin typeface="+mn-lt"/>
+                <a:ea typeface="+mn-ea"/>
+                <a:cs typeface="+mn-cs"/>
+              </a:defRPr>
+            </a:lvl6pPr>
+            <a:lvl7pPr marL="2971800" indent="-228600" algn="l" defTabSz="457200" rtl="0" eaLnBrk="1" latinLnBrk="0" hangingPunct="1">
+              <a:spcBef>
+                <a:spcPts val="1000"/>
+              </a:spcBef>
+              <a:spcAft>
+                <a:spcPts val="0"/>
+              </a:spcAft>
+              <a:buClr>
+                <a:schemeClr val="accent1"/>
+              </a:buClr>
+              <a:buSzPct val="80000"/>
+              <a:buFont typeface="Wingdings 3" charset="2"/>
+              <a:buChar char=""/>
+              <a:defRPr sz="1200" kern="1200">
+                <a:solidFill>
+                  <a:schemeClr val="tx1">
+                    <a:lumMod val="75000"/>
+                    <a:lumOff val="25000"/>
+                  </a:schemeClr>
+                </a:solidFill>
+                <a:latin typeface="+mn-lt"/>
+                <a:ea typeface="+mn-ea"/>
+                <a:cs typeface="+mn-cs"/>
+              </a:defRPr>
+            </a:lvl7pPr>
+            <a:lvl8pPr marL="3429000" indent="-228600" algn="l" defTabSz="457200" rtl="0" eaLnBrk="1" latinLnBrk="0" hangingPunct="1">
+              <a:spcBef>
+                <a:spcPts val="1000"/>
+              </a:spcBef>
+              <a:spcAft>
+                <a:spcPts val="0"/>
+              </a:spcAft>
+              <a:buClr>
+                <a:schemeClr val="accent1"/>
+              </a:buClr>
+              <a:buSzPct val="80000"/>
+              <a:buFont typeface="Wingdings 3" charset="2"/>
+              <a:buChar char=""/>
+              <a:defRPr sz="1200" kern="1200">
+                <a:solidFill>
+                  <a:schemeClr val="tx1">
+                    <a:lumMod val="75000"/>
+                    <a:lumOff val="25000"/>
+                  </a:schemeClr>
+                </a:solidFill>
+                <a:latin typeface="+mn-lt"/>
+                <a:ea typeface="+mn-ea"/>
+                <a:cs typeface="+mn-cs"/>
+              </a:defRPr>
+            </a:lvl8pPr>
+            <a:lvl9pPr marL="3886200" indent="-228600" algn="l" defTabSz="457200" rtl="0" eaLnBrk="1" latinLnBrk="0" hangingPunct="1">
+              <a:spcBef>
+                <a:spcPts val="1000"/>
+              </a:spcBef>
+              <a:spcAft>
+                <a:spcPts val="0"/>
+              </a:spcAft>
+              <a:buClr>
+                <a:schemeClr val="accent1"/>
+              </a:buClr>
+              <a:buSzPct val="80000"/>
+              <a:buFont typeface="Wingdings 3" charset="2"/>
+              <a:buChar char=""/>
+              <a:defRPr sz="1200" kern="1200">
+                <a:solidFill>
+                  <a:schemeClr val="tx1">
+                    <a:lumMod val="75000"/>
+                    <a:lumOff val="25000"/>
+                  </a:schemeClr>
+                </a:solidFill>
+                <a:latin typeface="+mn-lt"/>
+                <a:ea typeface="+mn-ea"/>
+                <a:cs typeface="+mn-cs"/>
+              </a:defRPr>
+            </a:lvl9pPr>
+          </a:lstStyle>
+          <a:p>
+            <a:pPr marL="0" indent="0" algn="ctr">
+              <a:buFont typeface="Wingdings 3" charset="2"/>
+              <a:buNone/>
+            </a:pPr>
+            <a:r>
+              <a:rPr lang="en-US" sz="1400" b="1" dirty="0"/>
+              <a:t>view from short side</a:t>
+            </a:r>
+            <a:endParaRPr lang="en-US" sz="1400" dirty="0"/>
+          </a:p>
+        </p:txBody>
+      </p:sp>
+      <p:cxnSp>
+        <p:nvCxnSpPr>
+          <p:cNvPr id="26" name="Straight Connector 25">
+            <a:extLst>
+              <a:ext uri="{FF2B5EF4-FFF2-40B4-BE49-F238E27FC236}">
+                <a16:creationId xmlns:a16="http://schemas.microsoft.com/office/drawing/2014/main" id="{FDFE9F13-B1F8-028C-2953-826D80E9E1A0}"/>
+              </a:ext>
+            </a:extLst>
+          </p:cNvPr>
+          <p:cNvCxnSpPr>
+            <a:cxnSpLocks/>
+          </p:cNvCxnSpPr>
+          <p:nvPr/>
+        </p:nvCxnSpPr>
+        <p:spPr>
+          <a:xfrm flipV="1">
+            <a:off x="6650079" y="3962963"/>
+            <a:ext cx="337565" cy="2161"/>
+          </a:xfrm>
+          <a:prstGeom prst="line">
+            <a:avLst/>
+          </a:prstGeom>
+          <a:ln w="31750">
+            <a:solidFill>
+              <a:schemeClr val="accent3">
+                <a:lumMod val="50000"/>
+              </a:schemeClr>
+            </a:solidFill>
+          </a:ln>
+        </p:spPr>
+        <p:style>
+          <a:lnRef idx="1">
+            <a:schemeClr val="accent1"/>
+          </a:lnRef>
+          <a:fillRef idx="0">
+            <a:schemeClr val="accent1"/>
+          </a:fillRef>
+          <a:effectRef idx="0">
+            <a:schemeClr val="accent1"/>
+          </a:effectRef>
+          <a:fontRef idx="minor">
+            <a:schemeClr val="tx1"/>
+          </a:fontRef>
+        </p:style>
+      </p:cxnSp>
+      <p:cxnSp>
+        <p:nvCxnSpPr>
+          <p:cNvPr id="56" name="Straight Connector 55">
+            <a:extLst>
+              <a:ext uri="{FF2B5EF4-FFF2-40B4-BE49-F238E27FC236}">
+                <a16:creationId xmlns:a16="http://schemas.microsoft.com/office/drawing/2014/main" id="{77FBE1BC-19E6-EAB0-5D8C-5A1AF5C58654}"/>
+              </a:ext>
+            </a:extLst>
+          </p:cNvPr>
+          <p:cNvCxnSpPr>
+            <a:cxnSpLocks/>
+          </p:cNvCxnSpPr>
+          <p:nvPr/>
+        </p:nvCxnSpPr>
+        <p:spPr>
+          <a:xfrm flipV="1">
+            <a:off x="5177157" y="3962223"/>
+            <a:ext cx="1476264" cy="230420"/>
+          </a:xfrm>
+          <a:prstGeom prst="line">
+            <a:avLst/>
+          </a:prstGeom>
+          <a:ln w="31750">
+            <a:solidFill>
+              <a:schemeClr val="accent3"/>
+            </a:solidFill>
+          </a:ln>
+        </p:spPr>
+        <p:style>
+          <a:lnRef idx="1">
+            <a:schemeClr val="accent1"/>
+          </a:lnRef>
+          <a:fillRef idx="0">
+            <a:schemeClr val="accent1"/>
+          </a:fillRef>
+          <a:effectRef idx="0">
+            <a:schemeClr val="accent1"/>
+          </a:effectRef>
+          <a:fontRef idx="minor">
+            <a:schemeClr val="tx1"/>
+          </a:fontRef>
+        </p:style>
+      </p:cxnSp>
+      <p:cxnSp>
+        <p:nvCxnSpPr>
+          <p:cNvPr id="62" name="Straight Connector 61">
+            <a:extLst>
+              <a:ext uri="{FF2B5EF4-FFF2-40B4-BE49-F238E27FC236}">
+                <a16:creationId xmlns:a16="http://schemas.microsoft.com/office/drawing/2014/main" id="{D7662BF7-AA9D-8F3D-00D7-7F1A85222EA7}"/>
+              </a:ext>
+            </a:extLst>
+          </p:cNvPr>
+          <p:cNvCxnSpPr>
+            <a:cxnSpLocks/>
+          </p:cNvCxnSpPr>
+          <p:nvPr/>
+        </p:nvCxnSpPr>
+        <p:spPr>
+          <a:xfrm flipH="1" flipV="1">
+            <a:off x="6980822" y="3960383"/>
+            <a:ext cx="1939464" cy="226296"/>
+          </a:xfrm>
+          <a:prstGeom prst="line">
+            <a:avLst/>
+          </a:prstGeom>
+          <a:ln w="31750">
+            <a:solidFill>
+              <a:schemeClr val="accent3"/>
+            </a:solidFill>
+          </a:ln>
+        </p:spPr>
+        <p:style>
+          <a:lnRef idx="1">
+            <a:schemeClr val="accent1"/>
+          </a:lnRef>
+          <a:fillRef idx="0">
+            <a:schemeClr val="accent1"/>
+          </a:fillRef>
+          <a:effectRef idx="0">
+            <a:schemeClr val="accent1"/>
+          </a:effectRef>
+          <a:fontRef idx="minor">
+            <a:schemeClr val="tx1"/>
+          </a:fontRef>
+        </p:style>
+      </p:cxnSp>
+      <p:sp>
+        <p:nvSpPr>
+          <p:cNvPr id="53" name="Content Placeholder 2">
+            <a:extLst>
+              <a:ext uri="{FF2B5EF4-FFF2-40B4-BE49-F238E27FC236}">
+                <a16:creationId xmlns:a16="http://schemas.microsoft.com/office/drawing/2014/main" id="{EA220DD7-D58D-E5AB-CD96-4E7B8B40EEC7}"/>
+              </a:ext>
+            </a:extLst>
+          </p:cNvPr>
+          <p:cNvSpPr txBox="1">
+            <a:spLocks/>
+          </p:cNvSpPr>
+          <p:nvPr/>
+        </p:nvSpPr>
+        <p:spPr>
+          <a:xfrm>
+            <a:off x="6248822" y="5300215"/>
+            <a:ext cx="1054894" cy="830150"/>
+          </a:xfrm>
+          <a:prstGeom prst="rect">
+            <a:avLst/>
+          </a:prstGeom>
+        </p:spPr>
+        <p:txBody>
+          <a:bodyPr vert="horz" lIns="91440" tIns="45720" rIns="91440" bIns="45720" rtlCol="0">
+            <a:normAutofit/>
+          </a:bodyPr>
+          <a:lstStyle>
+            <a:lvl1pPr marL="342900" indent="-342900" algn="l" defTabSz="457200" rtl="0" eaLnBrk="1" latinLnBrk="0" hangingPunct="1">
+              <a:spcBef>
+                <a:spcPts val="1000"/>
+              </a:spcBef>
+              <a:spcAft>
+                <a:spcPts val="0"/>
+              </a:spcAft>
+              <a:buClr>
+                <a:schemeClr val="accent1"/>
+              </a:buClr>
+              <a:buSzPct val="80000"/>
+              <a:buFont typeface="Wingdings 3" charset="2"/>
+              <a:buChar char=""/>
+              <a:defRPr sz="1800" kern="1200">
+                <a:solidFill>
+                  <a:schemeClr val="tx1">
+                    <a:lumMod val="75000"/>
+                    <a:lumOff val="25000"/>
+                  </a:schemeClr>
+                </a:solidFill>
+                <a:latin typeface="+mn-lt"/>
+                <a:ea typeface="+mn-ea"/>
+                <a:cs typeface="+mn-cs"/>
+              </a:defRPr>
+            </a:lvl1pPr>
+            <a:lvl2pPr marL="742950" indent="-285750" algn="l" defTabSz="457200" rtl="0" eaLnBrk="1" latinLnBrk="0" hangingPunct="1">
+              <a:spcBef>
+                <a:spcPts val="1000"/>
+              </a:spcBef>
+              <a:spcAft>
+                <a:spcPts val="0"/>
+              </a:spcAft>
+              <a:buClr>
+                <a:schemeClr val="accent1"/>
+              </a:buClr>
+              <a:buSzPct val="80000"/>
+              <a:buFont typeface="Wingdings 3" charset="2"/>
+              <a:buChar char=""/>
+              <a:defRPr sz="1600" kern="1200">
+                <a:solidFill>
+                  <a:schemeClr val="tx1">
+                    <a:lumMod val="75000"/>
+                    <a:lumOff val="25000"/>
+                  </a:schemeClr>
+                </a:solidFill>
+                <a:latin typeface="+mn-lt"/>
+                <a:ea typeface="+mn-ea"/>
+                <a:cs typeface="+mn-cs"/>
+              </a:defRPr>
+            </a:lvl2pPr>
+            <a:lvl3pPr marL="1143000" indent="-228600" algn="l" defTabSz="457200" rtl="0" eaLnBrk="1" latinLnBrk="0" hangingPunct="1">
+              <a:spcBef>
+                <a:spcPts val="1000"/>
+              </a:spcBef>
+              <a:spcAft>
+                <a:spcPts val="0"/>
+              </a:spcAft>
+              <a:buClr>
+                <a:schemeClr val="accent1"/>
+              </a:buClr>
+              <a:buSzPct val="80000"/>
+              <a:buFont typeface="Wingdings 3" charset="2"/>
+              <a:buChar char=""/>
+              <a:defRPr sz="1400" kern="1200">
+                <a:solidFill>
+                  <a:schemeClr val="tx1">
+                    <a:lumMod val="75000"/>
+                    <a:lumOff val="25000"/>
+                  </a:schemeClr>
+                </a:solidFill>
+                <a:latin typeface="+mn-lt"/>
+                <a:ea typeface="+mn-ea"/>
+                <a:cs typeface="+mn-cs"/>
+              </a:defRPr>
+            </a:lvl3pPr>
+            <a:lvl4pPr marL="1600200" indent="-228600" algn="l" defTabSz="457200" rtl="0" eaLnBrk="1" latinLnBrk="0" hangingPunct="1">
+              <a:spcBef>
+                <a:spcPts val="1000"/>
+              </a:spcBef>
+              <a:spcAft>
+                <a:spcPts val="0"/>
+              </a:spcAft>
+              <a:buClr>
+                <a:schemeClr val="accent1"/>
+              </a:buClr>
+              <a:buSzPct val="80000"/>
+              <a:buFont typeface="Wingdings 3" charset="2"/>
+              <a:buChar char=""/>
+              <a:defRPr sz="1200" kern="1200">
+                <a:solidFill>
+                  <a:schemeClr val="tx1">
+                    <a:lumMod val="75000"/>
+                    <a:lumOff val="25000"/>
+                  </a:schemeClr>
+                </a:solidFill>
+                <a:latin typeface="+mn-lt"/>
+                <a:ea typeface="+mn-ea"/>
+                <a:cs typeface="+mn-cs"/>
+              </a:defRPr>
+            </a:lvl4pPr>
+            <a:lvl5pPr marL="2057400" indent="-228600" algn="l" defTabSz="457200" rtl="0" eaLnBrk="1" latinLnBrk="0" hangingPunct="1">
+              <a:spcBef>
+                <a:spcPts val="1000"/>
+              </a:spcBef>
+              <a:spcAft>
+                <a:spcPts val="0"/>
+              </a:spcAft>
+              <a:buClr>
+                <a:schemeClr val="accent1"/>
+              </a:buClr>
+              <a:buSzPct val="80000"/>
+              <a:buFont typeface="Wingdings 3" charset="2"/>
+              <a:buChar char=""/>
+              <a:defRPr sz="1200" kern="1200">
+                <a:solidFill>
+                  <a:schemeClr val="tx1">
+                    <a:lumMod val="75000"/>
+                    <a:lumOff val="25000"/>
+                  </a:schemeClr>
+                </a:solidFill>
+                <a:latin typeface="+mn-lt"/>
+                <a:ea typeface="+mn-ea"/>
+                <a:cs typeface="+mn-cs"/>
+              </a:defRPr>
+            </a:lvl5pPr>
+            <a:lvl6pPr marL="2514600" indent="-228600" algn="l" defTabSz="457200" rtl="0" eaLnBrk="1" latinLnBrk="0" hangingPunct="1">
+              <a:spcBef>
+                <a:spcPts val="1000"/>
+              </a:spcBef>
+              <a:spcAft>
+                <a:spcPts val="0"/>
+              </a:spcAft>
+              <a:buClr>
+                <a:schemeClr val="accent1"/>
+              </a:buClr>
+              <a:buSzPct val="80000"/>
+              <a:buFont typeface="Wingdings 3" charset="2"/>
+              <a:buChar char=""/>
+              <a:defRPr sz="1200" kern="1200">
+                <a:solidFill>
+                  <a:schemeClr val="tx1">
+                    <a:lumMod val="75000"/>
+                    <a:lumOff val="25000"/>
+                  </a:schemeClr>
+                </a:solidFill>
+                <a:latin typeface="+mn-lt"/>
+                <a:ea typeface="+mn-ea"/>
+                <a:cs typeface="+mn-cs"/>
+              </a:defRPr>
+            </a:lvl6pPr>
+            <a:lvl7pPr marL="2971800" indent="-228600" algn="l" defTabSz="457200" rtl="0" eaLnBrk="1" latinLnBrk="0" hangingPunct="1">
+              <a:spcBef>
+                <a:spcPts val="1000"/>
+              </a:spcBef>
+              <a:spcAft>
+                <a:spcPts val="0"/>
+              </a:spcAft>
+              <a:buClr>
+                <a:schemeClr val="accent1"/>
+              </a:buClr>
+              <a:buSzPct val="80000"/>
+              <a:buFont typeface="Wingdings 3" charset="2"/>
+              <a:buChar char=""/>
+              <a:defRPr sz="1200" kern="1200">
+                <a:solidFill>
+                  <a:schemeClr val="tx1">
+                    <a:lumMod val="75000"/>
+                    <a:lumOff val="25000"/>
+                  </a:schemeClr>
+                </a:solidFill>
+                <a:latin typeface="+mn-lt"/>
+                <a:ea typeface="+mn-ea"/>
+                <a:cs typeface="+mn-cs"/>
+              </a:defRPr>
+            </a:lvl7pPr>
+            <a:lvl8pPr marL="3429000" indent="-228600" algn="l" defTabSz="457200" rtl="0" eaLnBrk="1" latinLnBrk="0" hangingPunct="1">
+              <a:spcBef>
+                <a:spcPts val="1000"/>
+              </a:spcBef>
+              <a:spcAft>
+                <a:spcPts val="0"/>
+              </a:spcAft>
+              <a:buClr>
+                <a:schemeClr val="accent1"/>
+              </a:buClr>
+              <a:buSzPct val="80000"/>
+              <a:buFont typeface="Wingdings 3" charset="2"/>
+              <a:buChar char=""/>
+              <a:defRPr sz="1200" kern="1200">
+                <a:solidFill>
+                  <a:schemeClr val="tx1">
+                    <a:lumMod val="75000"/>
+                    <a:lumOff val="25000"/>
+                  </a:schemeClr>
+                </a:solidFill>
+                <a:latin typeface="+mn-lt"/>
+                <a:ea typeface="+mn-ea"/>
+                <a:cs typeface="+mn-cs"/>
+              </a:defRPr>
+            </a:lvl8pPr>
+            <a:lvl9pPr marL="3886200" indent="-228600" algn="l" defTabSz="457200" rtl="0" eaLnBrk="1" latinLnBrk="0" hangingPunct="1">
+              <a:spcBef>
+                <a:spcPts val="1000"/>
+              </a:spcBef>
+              <a:spcAft>
+                <a:spcPts val="0"/>
+              </a:spcAft>
+              <a:buClr>
+                <a:schemeClr val="accent1"/>
+              </a:buClr>
+              <a:buSzPct val="80000"/>
+              <a:buFont typeface="Wingdings 3" charset="2"/>
+              <a:buChar char=""/>
+              <a:defRPr sz="1200" kern="1200">
+                <a:solidFill>
+                  <a:schemeClr val="tx1">
+                    <a:lumMod val="75000"/>
+                    <a:lumOff val="25000"/>
+                  </a:schemeClr>
+                </a:solidFill>
+                <a:latin typeface="+mn-lt"/>
+                <a:ea typeface="+mn-ea"/>
+                <a:cs typeface="+mn-cs"/>
+              </a:defRPr>
+            </a:lvl9pPr>
+          </a:lstStyle>
+          <a:p>
+            <a:pPr marL="0" indent="0" algn="ctr">
+              <a:buFont typeface="Wingdings 3" charset="2"/>
+              <a:buNone/>
+            </a:pPr>
+            <a:r>
+              <a:rPr lang="en-US" sz="1400" b="1" dirty="0"/>
+              <a:t>view from long side</a:t>
+            </a:r>
+            <a:endParaRPr lang="en-US" sz="1400" dirty="0"/>
+          </a:p>
+        </p:txBody>
+      </p:sp>
     </p:spTree>
     <p:extLst>
       <p:ext uri="{BB962C8B-B14F-4D97-AF65-F5344CB8AC3E}">
@@ -11854,7 +12498,7 @@
         </p:spPr>
         <p:txBody>
           <a:bodyPr>
-            <a:normAutofit/>
+            <a:normAutofit lnSpcReduction="10000"/>
           </a:bodyPr>
           <a:lstStyle/>
           <a:p>
@@ -11869,19 +12513,19 @@
           <a:p>
             <a:r>
               <a:rPr lang="en-US" sz="1600" dirty="0"/>
-              <a:t>Depth: deep = less frequent</a:t>
+              <a:t>Depth: deep → less frequent</a:t>
             </a:r>
           </a:p>
           <a:p>
             <a:r>
               <a:rPr lang="en-US" sz="1600" dirty="0"/>
-              <a:t>Shape: bulbous = less, fluting = more</a:t>
+              <a:t>Shape: bulbous → less, fluting → more</a:t>
             </a:r>
           </a:p>
           <a:p>
             <a:r>
               <a:rPr lang="en-US" sz="1600" dirty="0"/>
-              <a:t>Inner surface: glazed = more</a:t>
+              <a:t>Inner surface: glazed → more</a:t>
             </a:r>
             <a:endParaRPr lang="en-US" dirty="0"/>
           </a:p>
@@ -11897,13 +12541,19 @@
           <a:p>
             <a:r>
               <a:rPr lang="en-US" sz="1600" dirty="0"/>
-              <a:t>Drainage: well-draining = more</a:t>
+              <a:t>Drainage: well-draining → more</a:t>
             </a:r>
           </a:p>
           <a:p>
             <a:r>
               <a:rPr lang="en-US" sz="1600" dirty="0"/>
-              <a:t>Degradation: older = harder to water</a:t>
+              <a:t>Degradation: older → harder to water</a:t>
+            </a:r>
+          </a:p>
+          <a:p>
+            <a:r>
+              <a:rPr lang="en-US" sz="1600" dirty="0"/>
+              <a:t>Covering(s): dead sphagnum and/or live moss → harder to water but slightly less (in theory)</a:t>
             </a:r>
             <a:endParaRPr lang="en-US" dirty="0"/>
           </a:p>
@@ -11919,7 +12569,7 @@
           <a:p>
             <a:r>
               <a:rPr lang="en-US" sz="1600" dirty="0"/>
-              <a:t>Maturity: older = less (in theory)</a:t>
+              <a:t>Maturity: older → less (in theory)</a:t>
             </a:r>
           </a:p>
           <a:p>
@@ -11929,13 +12579,13 @@
             </a:r>
             <a:r>
               <a:rPr lang="en-US" sz="1600" dirty="0"/>
-              <a:t>: heavy = more</a:t>
+              <a:t>: heavy → more</a:t>
             </a:r>
           </a:p>
           <a:p>
             <a:r>
               <a:rPr lang="en-US" sz="1600" dirty="0"/>
-              <a:t>Re-potting: recent = more</a:t>
+              <a:t>Re-potting: recent → more</a:t>
             </a:r>
             <a:endParaRPr lang="en-GB" sz="1600" dirty="0"/>
           </a:p>
@@ -11965,7 +12615,7 @@
         </p:spPr>
         <p:txBody>
           <a:bodyPr>
-            <a:normAutofit/>
+            <a:normAutofit lnSpcReduction="10000"/>
           </a:bodyPr>
           <a:lstStyle/>
           <a:p>
@@ -11980,19 +12630,19 @@
           <a:p>
             <a:r>
               <a:rPr lang="en-US" sz="1600" dirty="0"/>
-              <a:t>Wind: windier = more</a:t>
+              <a:t>Wind: windier → more</a:t>
             </a:r>
           </a:p>
           <a:p>
             <a:r>
               <a:rPr lang="en-US" sz="1600" dirty="0"/>
-              <a:t>Sun: sunny = more, shady = less</a:t>
+              <a:t>Sun: sunny → more, shady → less</a:t>
             </a:r>
           </a:p>
           <a:p>
             <a:r>
               <a:rPr lang="en-US" sz="1600" dirty="0"/>
-              <a:t>Heat: hotter = more, colder = less</a:t>
+              <a:t>Heat: hotter → more, colder → less</a:t>
             </a:r>
           </a:p>
           <a:p>
@@ -12004,7 +12654,7 @@
           <a:p>
             <a:r>
               <a:rPr lang="en-US" sz="1600" dirty="0"/>
-              <a:t>Warning: these factors are “non-linear”!  For example: double the sun can mean 4x the water.</a:t>
+              <a:t>Warning: these factors are “non-linear”!  A small increase in e.g. sun can mean a big increase in watering.</a:t>
             </a:r>
           </a:p>
           <a:p>

</xml_diff>

<commit_message>
Added logos (Nemeta, WG, PG) to title slide Cross-updated event deck (N & PG only)
</commit_message>
<xml_diff>
--- a/Courseware/Bonsai Evening A (2024-07-04).pptx
+++ b/Courseware/Bonsai Evening A (2024-07-04).pptx
@@ -5934,7 +5934,7 @@
         <p:spPr/>
         <p:txBody>
           <a:bodyPr>
-            <a:normAutofit lnSpcReduction="10000"/>
+            <a:normAutofit/>
           </a:bodyPr>
           <a:lstStyle/>
           <a:p>
@@ -5949,15 +5949,161 @@
               <a:t>July 2024</a:t>
             </a:r>
           </a:p>
-          <a:p>
-            <a:r>
-              <a:rPr lang="en-US" dirty="0"/>
-              <a:t>Phoenix Garden</a:t>
-            </a:r>
-            <a:endParaRPr lang="en-GB" dirty="0"/>
-          </a:p>
-        </p:txBody>
-      </p:sp>
+        </p:txBody>
+      </p:sp>
+      <p:grpSp>
+        <p:nvGrpSpPr>
+          <p:cNvPr id="4" name="Group 3">
+            <a:extLst>
+              <a:ext uri="{FF2B5EF4-FFF2-40B4-BE49-F238E27FC236}">
+                <a16:creationId xmlns:a16="http://schemas.microsoft.com/office/drawing/2014/main" id="{50ECEF1E-B9DD-7C7C-D34D-A16C75848A55}"/>
+              </a:ext>
+            </a:extLst>
+          </p:cNvPr>
+          <p:cNvGrpSpPr/>
+          <p:nvPr/>
+        </p:nvGrpSpPr>
+        <p:grpSpPr>
+          <a:xfrm>
+            <a:off x="982632" y="4663538"/>
+            <a:ext cx="1801905" cy="1799092"/>
+            <a:chOff x="606114" y="4663538"/>
+            <a:chExt cx="1801905" cy="1799092"/>
+          </a:xfrm>
+        </p:grpSpPr>
+        <p:pic>
+          <p:nvPicPr>
+            <p:cNvPr id="5" name="Picture 4">
+              <a:extLst>
+                <a:ext uri="{FF2B5EF4-FFF2-40B4-BE49-F238E27FC236}">
+                  <a16:creationId xmlns:a16="http://schemas.microsoft.com/office/drawing/2014/main" id="{EFD1B531-63E8-82B4-2F90-BE188C374A20}"/>
+                </a:ext>
+              </a:extLst>
+            </p:cNvPr>
+            <p:cNvPicPr>
+              <a:picLocks noChangeAspect="1"/>
+            </p:cNvPicPr>
+            <p:nvPr/>
+          </p:nvPicPr>
+          <p:blipFill>
+            <a:blip r:embed="rId2"/>
+            <a:stretch>
+              <a:fillRect/>
+            </a:stretch>
+          </p:blipFill>
+          <p:spPr>
+            <a:xfrm>
+              <a:off x="606114" y="4663538"/>
+              <a:ext cx="1801905" cy="1183540"/>
+            </a:xfrm>
+            <a:prstGeom prst="rect">
+              <a:avLst/>
+            </a:prstGeom>
+          </p:spPr>
+        </p:pic>
+        <p:sp>
+          <p:nvSpPr>
+            <p:cNvPr id="6" name="TextBox 5">
+              <a:extLst>
+                <a:ext uri="{FF2B5EF4-FFF2-40B4-BE49-F238E27FC236}">
+                  <a16:creationId xmlns:a16="http://schemas.microsoft.com/office/drawing/2014/main" id="{59E7C155-3620-D019-BD0D-DFE1C1B8A88A}"/>
+                </a:ext>
+              </a:extLst>
+            </p:cNvPr>
+            <p:cNvSpPr txBox="1"/>
+            <p:nvPr/>
+          </p:nvSpPr>
+          <p:spPr>
+            <a:xfrm>
+              <a:off x="606114" y="5847077"/>
+              <a:ext cx="1801905" cy="615553"/>
+            </a:xfrm>
+            <a:prstGeom prst="rect">
+              <a:avLst/>
+            </a:prstGeom>
+            <a:noFill/>
+          </p:spPr>
+          <p:txBody>
+            <a:bodyPr wrap="square" rtlCol="0">
+              <a:spAutoFit/>
+            </a:bodyPr>
+            <a:lstStyle/>
+            <a:p>
+              <a:pPr algn="ctr"/>
+              <a:r>
+                <a:rPr lang="en-US" dirty="0" err="1">
+                  <a:solidFill>
+                    <a:schemeClr val="accent3">
+                      <a:lumMod val="50000"/>
+                    </a:schemeClr>
+                  </a:solidFill>
+                </a:rPr>
+                <a:t>Nemeta</a:t>
+              </a:r>
+              <a:r>
+                <a:rPr lang="en-US" dirty="0">
+                  <a:solidFill>
+                    <a:schemeClr val="accent3">
+                      <a:lumMod val="50000"/>
+                    </a:schemeClr>
+                  </a:solidFill>
+                </a:rPr>
+                <a:t> Bonsai</a:t>
+              </a:r>
+            </a:p>
+            <a:p>
+              <a:pPr algn="ctr"/>
+              <a:r>
+                <a:rPr lang="en-US" sz="1600" dirty="0">
+                  <a:solidFill>
+                    <a:schemeClr val="accent3">
+                      <a:lumMod val="50000"/>
+                    </a:schemeClr>
+                  </a:solidFill>
+                </a:rPr>
+                <a:t>nemeta.co.uk</a:t>
+              </a:r>
+              <a:endParaRPr lang="en-GB" sz="1600" dirty="0">
+                <a:solidFill>
+                  <a:schemeClr val="accent3">
+                    <a:lumMod val="50000"/>
+                  </a:schemeClr>
+                </a:solidFill>
+              </a:endParaRPr>
+            </a:p>
+          </p:txBody>
+        </p:sp>
+      </p:grpSp>
+      <p:pic>
+        <p:nvPicPr>
+          <p:cNvPr id="7" name="Picture 6">
+            <a:extLst>
+              <a:ext uri="{FF2B5EF4-FFF2-40B4-BE49-F238E27FC236}">
+                <a16:creationId xmlns:a16="http://schemas.microsoft.com/office/drawing/2014/main" id="{0892C7DB-1612-4672-BBAD-61056E0380AF}"/>
+              </a:ext>
+            </a:extLst>
+          </p:cNvPr>
+          <p:cNvPicPr>
+            <a:picLocks noChangeAspect="1"/>
+          </p:cNvPicPr>
+          <p:nvPr/>
+        </p:nvPicPr>
+        <p:blipFill>
+          <a:blip r:embed="rId3"/>
+          <a:stretch>
+            <a:fillRect/>
+          </a:stretch>
+        </p:blipFill>
+        <p:spPr>
+          <a:xfrm>
+            <a:off x="3939974" y="4663538"/>
+            <a:ext cx="1801905" cy="1801905"/>
+          </a:xfrm>
+          <a:prstGeom prst="rect">
+            <a:avLst/>
+          </a:prstGeom>
+        </p:spPr>
+      </p:pic>
     </p:spTree>
     <p:extLst>
       <p:ext uri="{BB962C8B-B14F-4D97-AF65-F5344CB8AC3E}">

</xml_diff>